<commit_message>
New video lecture slides for kinematics (12.6, 12.7, 12.8)
</commit_message>
<xml_diff>
--- a/Lecture Slides/VideoLectureSlides/12.6 vector.pptx
+++ b/Lecture Slides/VideoLectureSlides/12.6 vector.pptx
@@ -5,7 +5,7 @@
     <p:sldMasterId id="2147483660" r:id="rId4"/>
   </p:sldMasterIdLst>
   <p:notesMasterIdLst>
-    <p:notesMasterId r:id="rId25"/>
+    <p:notesMasterId r:id="rId26"/>
   </p:notesMasterIdLst>
   <p:sldIdLst>
     <p:sldId id="256" r:id="rId5"/>
@@ -25,9 +25,10 @@
     <p:sldId id="265" r:id="rId19"/>
     <p:sldId id="287" r:id="rId20"/>
     <p:sldId id="288" r:id="rId21"/>
-    <p:sldId id="266" r:id="rId22"/>
-    <p:sldId id="268" r:id="rId23"/>
-    <p:sldId id="270" r:id="rId24"/>
+    <p:sldId id="300" r:id="rId22"/>
+    <p:sldId id="266" r:id="rId23"/>
+    <p:sldId id="268" r:id="rId24"/>
+    <p:sldId id="270" r:id="rId25"/>
   </p:sldIdLst>
   <p:sldSz cx="9144000" cy="6858000" type="screen4x3"/>
   <p:notesSz cx="6858000" cy="9144000"/>
@@ -241,7 +242,7 @@
           <a:p>
             <a:fld id="{1AA1AB63-216F-4D5B-8811-CCB935E98D4A}" type="datetimeFigureOut">
               <a:rPr lang="en-US" smtClean="0"/>
-              <a:t>9/15/21</a:t>
+              <a:t>9/17/21</a:t>
             </a:fld>
             <a:endParaRPr lang="en-US" dirty="0"/>
           </a:p>
@@ -657,7 +658,7 @@
           <a:p>
             <a:fld id="{198B1ED1-A6A8-44D7-9A75-7C99E7381227}" type="slidenum">
               <a:rPr lang="en-US" smtClean="0"/>
-              <a:t>20</a:t>
+              <a:t>21</a:t>
             </a:fld>
             <a:endParaRPr lang="en-US"/>
           </a:p>
@@ -3976,8 +3977,8 @@
           </a:p>
         </p:txBody>
       </p:sp>
-      <mc:AlternateContent xmlns:mc="http://schemas.openxmlformats.org/markup-compatibility/2006">
-        <mc:Choice xmlns:a14="http://schemas.microsoft.com/office/drawing/2010/main" Requires="a14">
+      <mc:AlternateContent xmlns:mc="http://schemas.openxmlformats.org/markup-compatibility/2006" xmlns:a14="http://schemas.microsoft.com/office/drawing/2010/main">
+        <mc:Choice Requires="a14">
           <p:sp>
             <p:nvSpPr>
               <p:cNvPr id="3" name="Content Placeholder 2">
@@ -4585,7 +4586,7 @@
             </p:txBody>
           </p:sp>
         </mc:Choice>
-        <mc:Fallback>
+        <mc:Fallback xmlns="">
           <p:sp>
             <p:nvSpPr>
               <p:cNvPr id="3" name="Content Placeholder 2">
@@ -4760,8 +4761,8 @@
             </a:fontRef>
           </p:style>
         </p:cxnSp>
-        <mc:AlternateContent xmlns:mc="http://schemas.openxmlformats.org/markup-compatibility/2006">
-          <mc:Choice xmlns:a14="http://schemas.microsoft.com/office/drawing/2010/main" Requires="a14">
+        <mc:AlternateContent xmlns:mc="http://schemas.openxmlformats.org/markup-compatibility/2006" xmlns:a14="http://schemas.microsoft.com/office/drawing/2010/main">
+          <mc:Choice Requires="a14">
             <p:sp>
               <p:nvSpPr>
                 <p:cNvPr id="39" name="TextBox 38">
@@ -4790,6 +4791,7 @@
                 </a:bodyPr>
                 <a:lstStyle/>
                 <a:p>
+                  <a:pPr/>
                   <a14:m>
                     <m:oMathPara xmlns:m="http://schemas.openxmlformats.org/officeDocument/2006/math">
                       <m:oMathParaPr>
@@ -4810,7 +4812,7 @@
               </p:txBody>
             </p:sp>
           </mc:Choice>
-          <mc:Fallback>
+          <mc:Fallback xmlns="">
             <p:sp>
               <p:nvSpPr>
                 <p:cNvPr id="39" name="TextBox 38">
@@ -4855,8 +4857,8 @@
             </p:sp>
           </mc:Fallback>
         </mc:AlternateContent>
-        <mc:AlternateContent xmlns:mc="http://schemas.openxmlformats.org/markup-compatibility/2006">
-          <mc:Choice xmlns:a14="http://schemas.microsoft.com/office/drawing/2010/main" Requires="a14">
+        <mc:AlternateContent xmlns:mc="http://schemas.openxmlformats.org/markup-compatibility/2006" xmlns:a14="http://schemas.microsoft.com/office/drawing/2010/main">
+          <mc:Choice Requires="a14">
             <p:sp>
               <p:nvSpPr>
                 <p:cNvPr id="40" name="TextBox 39">
@@ -4885,6 +4887,7 @@
                 </a:bodyPr>
                 <a:lstStyle/>
                 <a:p>
+                  <a:pPr/>
                   <a14:m>
                     <m:oMathPara xmlns:m="http://schemas.openxmlformats.org/officeDocument/2006/math">
                       <m:oMathParaPr>
@@ -4905,7 +4908,7 @@
               </p:txBody>
             </p:sp>
           </mc:Choice>
-          <mc:Fallback>
+          <mc:Fallback xmlns="">
             <p:sp>
               <p:nvSpPr>
                 <p:cNvPr id="40" name="TextBox 39">
@@ -5752,8 +5755,8 @@
           </a:fontRef>
         </p:style>
       </p:cxnSp>
-      <mc:AlternateContent xmlns:mc="http://schemas.openxmlformats.org/markup-compatibility/2006">
-        <mc:Choice xmlns:a14="http://schemas.microsoft.com/office/drawing/2010/main" Requires="a14">
+      <mc:AlternateContent xmlns:mc="http://schemas.openxmlformats.org/markup-compatibility/2006" xmlns:a14="http://schemas.microsoft.com/office/drawing/2010/main">
+        <mc:Choice Requires="a14">
           <p:sp>
             <p:nvSpPr>
               <p:cNvPr id="66" name="TextBox 65">
@@ -5782,6 +5785,7 @@
               </a:bodyPr>
               <a:lstStyle/>
               <a:p>
+                <a:pPr/>
                 <a14:m>
                   <m:oMathPara xmlns:m="http://schemas.openxmlformats.org/officeDocument/2006/math">
                     <m:oMathParaPr>
@@ -5851,7 +5855,7 @@
             </p:txBody>
           </p:sp>
         </mc:Choice>
-        <mc:Fallback>
+        <mc:Fallback xmlns="">
           <p:sp>
             <p:nvSpPr>
               <p:cNvPr id="66" name="TextBox 65">
@@ -6136,8 +6140,8 @@
           </a:p>
         </p:txBody>
       </p:sp>
-      <mc:AlternateContent xmlns:mc="http://schemas.openxmlformats.org/markup-compatibility/2006">
-        <mc:Choice xmlns:a14="http://schemas.microsoft.com/office/drawing/2010/main" Requires="a14">
+      <mc:AlternateContent xmlns:mc="http://schemas.openxmlformats.org/markup-compatibility/2006" xmlns:a14="http://schemas.microsoft.com/office/drawing/2010/main">
+        <mc:Choice Requires="a14">
           <p:sp>
             <p:nvSpPr>
               <p:cNvPr id="61" name="TextBox 60">
@@ -6166,6 +6170,7 @@
               </a:bodyPr>
               <a:lstStyle/>
               <a:p>
+                <a:pPr/>
                 <a14:m>
                   <m:oMathPara xmlns:m="http://schemas.openxmlformats.org/officeDocument/2006/math">
                     <m:oMathParaPr>
@@ -6198,7 +6203,7 @@
             </p:txBody>
           </p:sp>
         </mc:Choice>
-        <mc:Fallback>
+        <mc:Fallback xmlns="">
           <p:sp>
             <p:nvSpPr>
               <p:cNvPr id="61" name="TextBox 60">
@@ -6423,8 +6428,8 @@
           </a:fontRef>
         </p:style>
       </p:cxnSp>
-      <mc:AlternateContent xmlns:mc="http://schemas.openxmlformats.org/markup-compatibility/2006">
-        <mc:Choice xmlns:a14="http://schemas.microsoft.com/office/drawing/2010/main" Requires="a14">
+      <mc:AlternateContent xmlns:mc="http://schemas.openxmlformats.org/markup-compatibility/2006" xmlns:a14="http://schemas.microsoft.com/office/drawing/2010/main">
+        <mc:Choice Requires="a14">
           <p:sp>
             <p:nvSpPr>
               <p:cNvPr id="70" name="TextBox 69">
@@ -6453,6 +6458,7 @@
               </a:bodyPr>
               <a:lstStyle/>
               <a:p>
+                <a:pPr/>
                 <a14:m>
                   <m:oMathPara xmlns:m="http://schemas.openxmlformats.org/officeDocument/2006/math">
                     <m:oMathParaPr>
@@ -6507,7 +6513,7 @@
             </p:txBody>
           </p:sp>
         </mc:Choice>
-        <mc:Fallback>
+        <mc:Fallback xmlns="">
           <p:sp>
             <p:nvSpPr>
               <p:cNvPr id="70" name="TextBox 69">
@@ -6552,8 +6558,8 @@
           </p:sp>
         </mc:Fallback>
       </mc:AlternateContent>
-      <mc:AlternateContent xmlns:mc="http://schemas.openxmlformats.org/markup-compatibility/2006">
-        <mc:Choice xmlns:a14="http://schemas.microsoft.com/office/drawing/2010/main" Requires="a14">
+      <mc:AlternateContent xmlns:mc="http://schemas.openxmlformats.org/markup-compatibility/2006" xmlns:a14="http://schemas.microsoft.com/office/drawing/2010/main">
+        <mc:Choice Requires="a14">
           <p:sp>
             <p:nvSpPr>
               <p:cNvPr id="71" name="TextBox 70">
@@ -6582,6 +6588,7 @@
               </a:bodyPr>
               <a:lstStyle/>
               <a:p>
+                <a:pPr/>
                 <a14:m>
                   <m:oMathPara xmlns:m="http://schemas.openxmlformats.org/officeDocument/2006/math">
                     <m:oMathParaPr>
@@ -6636,7 +6643,7 @@
             </p:txBody>
           </p:sp>
         </mc:Choice>
-        <mc:Fallback>
+        <mc:Fallback xmlns="">
           <p:sp>
             <p:nvSpPr>
               <p:cNvPr id="71" name="TextBox 70">
@@ -6990,8 +6997,8 @@
             </a:fontRef>
           </p:style>
         </p:cxnSp>
-        <mc:AlternateContent xmlns:mc="http://schemas.openxmlformats.org/markup-compatibility/2006">
-          <mc:Choice xmlns:a14="http://schemas.microsoft.com/office/drawing/2010/main" Requires="a14">
+        <mc:AlternateContent xmlns:mc="http://schemas.openxmlformats.org/markup-compatibility/2006" xmlns:a14="http://schemas.microsoft.com/office/drawing/2010/main">
+          <mc:Choice Requires="a14">
             <p:sp>
               <p:nvSpPr>
                 <p:cNvPr id="34" name="TextBox 33">
@@ -7020,6 +7027,7 @@
                 </a:bodyPr>
                 <a:lstStyle/>
                 <a:p>
+                  <a:pPr/>
                   <a14:m>
                     <m:oMathPara xmlns:m="http://schemas.openxmlformats.org/officeDocument/2006/math">
                       <m:oMathParaPr>
@@ -7059,7 +7067,7 @@
               </p:txBody>
             </p:sp>
           </mc:Choice>
-          <mc:Fallback>
+          <mc:Fallback xmlns="">
             <p:sp>
               <p:nvSpPr>
                 <p:cNvPr id="34" name="TextBox 33">
@@ -7104,8 +7112,8 @@
             </p:sp>
           </mc:Fallback>
         </mc:AlternateContent>
-        <mc:AlternateContent xmlns:mc="http://schemas.openxmlformats.org/markup-compatibility/2006">
-          <mc:Choice xmlns:a14="http://schemas.microsoft.com/office/drawing/2010/main" Requires="a14">
+        <mc:AlternateContent xmlns:mc="http://schemas.openxmlformats.org/markup-compatibility/2006" xmlns:a14="http://schemas.microsoft.com/office/drawing/2010/main">
+          <mc:Choice Requires="a14">
             <p:sp>
               <p:nvSpPr>
                 <p:cNvPr id="35" name="TextBox 34">
@@ -7134,6 +7142,7 @@
                 </a:bodyPr>
                 <a:lstStyle/>
                 <a:p>
+                  <a:pPr/>
                   <a14:m>
                     <m:oMathPara xmlns:m="http://schemas.openxmlformats.org/officeDocument/2006/math">
                       <m:oMathParaPr>
@@ -7173,7 +7182,7 @@
               </p:txBody>
             </p:sp>
           </mc:Choice>
-          <mc:Fallback>
+          <mc:Fallback xmlns="">
             <p:sp>
               <p:nvSpPr>
                 <p:cNvPr id="35" name="TextBox 34">
@@ -7279,8 +7288,8 @@
           </a:p>
         </p:txBody>
       </p:sp>
-      <mc:AlternateContent xmlns:mc="http://schemas.openxmlformats.org/markup-compatibility/2006">
-        <mc:Choice xmlns:a14="http://schemas.microsoft.com/office/drawing/2010/main" Requires="a14">
+      <mc:AlternateContent xmlns:mc="http://schemas.openxmlformats.org/markup-compatibility/2006" xmlns:a14="http://schemas.microsoft.com/office/drawing/2010/main">
+        <mc:Choice Requires="a14">
           <p:sp>
             <p:nvSpPr>
               <p:cNvPr id="3" name="Content Placeholder 2">
@@ -7648,7 +7657,7 @@
             </p:txBody>
           </p:sp>
         </mc:Choice>
-        <mc:Fallback>
+        <mc:Fallback xmlns="">
           <p:sp>
             <p:nvSpPr>
               <p:cNvPr id="3" name="Content Placeholder 2">
@@ -7823,8 +7832,8 @@
             </a:fontRef>
           </p:style>
         </p:cxnSp>
-        <mc:AlternateContent xmlns:mc="http://schemas.openxmlformats.org/markup-compatibility/2006">
-          <mc:Choice xmlns:a14="http://schemas.microsoft.com/office/drawing/2010/main" Requires="a14">
+        <mc:AlternateContent xmlns:mc="http://schemas.openxmlformats.org/markup-compatibility/2006" xmlns:a14="http://schemas.microsoft.com/office/drawing/2010/main">
+          <mc:Choice Requires="a14">
             <p:sp>
               <p:nvSpPr>
                 <p:cNvPr id="39" name="TextBox 38">
@@ -7853,6 +7862,7 @@
                 </a:bodyPr>
                 <a:lstStyle/>
                 <a:p>
+                  <a:pPr/>
                   <a14:m>
                     <m:oMathPara xmlns:m="http://schemas.openxmlformats.org/officeDocument/2006/math">
                       <m:oMathParaPr>
@@ -7873,7 +7883,7 @@
               </p:txBody>
             </p:sp>
           </mc:Choice>
-          <mc:Fallback>
+          <mc:Fallback xmlns="">
             <p:sp>
               <p:nvSpPr>
                 <p:cNvPr id="39" name="TextBox 38">
@@ -7918,8 +7928,8 @@
             </p:sp>
           </mc:Fallback>
         </mc:AlternateContent>
-        <mc:AlternateContent xmlns:mc="http://schemas.openxmlformats.org/markup-compatibility/2006">
-          <mc:Choice xmlns:a14="http://schemas.microsoft.com/office/drawing/2010/main" Requires="a14">
+        <mc:AlternateContent xmlns:mc="http://schemas.openxmlformats.org/markup-compatibility/2006" xmlns:a14="http://schemas.microsoft.com/office/drawing/2010/main">
+          <mc:Choice Requires="a14">
             <p:sp>
               <p:nvSpPr>
                 <p:cNvPr id="40" name="TextBox 39">
@@ -7948,6 +7958,7 @@
                 </a:bodyPr>
                 <a:lstStyle/>
                 <a:p>
+                  <a:pPr/>
                   <a14:m>
                     <m:oMathPara xmlns:m="http://schemas.openxmlformats.org/officeDocument/2006/math">
                       <m:oMathParaPr>
@@ -7968,7 +7979,7 @@
               </p:txBody>
             </p:sp>
           </mc:Choice>
-          <mc:Fallback>
+          <mc:Fallback xmlns="">
             <p:sp>
               <p:nvSpPr>
                 <p:cNvPr id="40" name="TextBox 39">
@@ -8375,8 +8386,8 @@
           </a:fontRef>
         </p:style>
       </p:cxnSp>
-      <mc:AlternateContent xmlns:mc="http://schemas.openxmlformats.org/markup-compatibility/2006">
-        <mc:Choice xmlns:a14="http://schemas.microsoft.com/office/drawing/2010/main" Requires="a14">
+      <mc:AlternateContent xmlns:mc="http://schemas.openxmlformats.org/markup-compatibility/2006" xmlns:a14="http://schemas.microsoft.com/office/drawing/2010/main">
+        <mc:Choice Requires="a14">
           <p:sp>
             <p:nvSpPr>
               <p:cNvPr id="66" name="TextBox 65">
@@ -8405,6 +8416,7 @@
               </a:bodyPr>
               <a:lstStyle/>
               <a:p>
+                <a:pPr/>
                 <a14:m>
                   <m:oMathPara xmlns:m="http://schemas.openxmlformats.org/officeDocument/2006/math">
                     <m:oMathParaPr>
@@ -8474,7 +8486,7 @@
             </p:txBody>
           </p:sp>
         </mc:Choice>
-        <mc:Fallback>
+        <mc:Fallback xmlns="">
           <p:sp>
             <p:nvSpPr>
               <p:cNvPr id="66" name="TextBox 65">
@@ -8762,8 +8774,8 @@
             </a:fontRef>
           </p:style>
         </p:cxnSp>
-        <mc:AlternateContent xmlns:mc="http://schemas.openxmlformats.org/markup-compatibility/2006">
-          <mc:Choice xmlns:a14="http://schemas.microsoft.com/office/drawing/2010/main" Requires="a14">
+        <mc:AlternateContent xmlns:mc="http://schemas.openxmlformats.org/markup-compatibility/2006" xmlns:a14="http://schemas.microsoft.com/office/drawing/2010/main">
+          <mc:Choice Requires="a14">
             <p:sp>
               <p:nvSpPr>
                 <p:cNvPr id="34" name="TextBox 33">
@@ -8792,6 +8804,7 @@
                 </a:bodyPr>
                 <a:lstStyle/>
                 <a:p>
+                  <a:pPr/>
                   <a14:m>
                     <m:oMathPara xmlns:m="http://schemas.openxmlformats.org/officeDocument/2006/math">
                       <m:oMathParaPr>
@@ -8831,7 +8844,7 @@
               </p:txBody>
             </p:sp>
           </mc:Choice>
-          <mc:Fallback>
+          <mc:Fallback xmlns="">
             <p:sp>
               <p:nvSpPr>
                 <p:cNvPr id="34" name="TextBox 33">
@@ -8876,8 +8889,8 @@
             </p:sp>
           </mc:Fallback>
         </mc:AlternateContent>
-        <mc:AlternateContent xmlns:mc="http://schemas.openxmlformats.org/markup-compatibility/2006">
-          <mc:Choice xmlns:a14="http://schemas.microsoft.com/office/drawing/2010/main" Requires="a14">
+        <mc:AlternateContent xmlns:mc="http://schemas.openxmlformats.org/markup-compatibility/2006" xmlns:a14="http://schemas.microsoft.com/office/drawing/2010/main">
+          <mc:Choice Requires="a14">
             <p:sp>
               <p:nvSpPr>
                 <p:cNvPr id="35" name="TextBox 34">
@@ -8906,6 +8919,7 @@
                 </a:bodyPr>
                 <a:lstStyle/>
                 <a:p>
+                  <a:pPr/>
                   <a14:m>
                     <m:oMathPara xmlns:m="http://schemas.openxmlformats.org/officeDocument/2006/math">
                       <m:oMathParaPr>
@@ -8945,7 +8959,7 @@
               </p:txBody>
             </p:sp>
           </mc:Choice>
-          <mc:Fallback>
+          <mc:Fallback xmlns="">
             <p:sp>
               <p:nvSpPr>
                 <p:cNvPr id="35" name="TextBox 34">
@@ -9126,8 +9140,8 @@
           </a:p>
         </p:txBody>
       </p:sp>
-      <mc:AlternateContent xmlns:mc="http://schemas.openxmlformats.org/markup-compatibility/2006">
-        <mc:Choice xmlns:a14="http://schemas.microsoft.com/office/drawing/2010/main" Requires="a14">
+      <mc:AlternateContent xmlns:mc="http://schemas.openxmlformats.org/markup-compatibility/2006" xmlns:a14="http://schemas.microsoft.com/office/drawing/2010/main">
+        <mc:Choice Requires="a14">
           <p:sp>
             <p:nvSpPr>
               <p:cNvPr id="61" name="TextBox 60">
@@ -9156,6 +9170,7 @@
               </a:bodyPr>
               <a:lstStyle/>
               <a:p>
+                <a:pPr/>
                 <a14:m>
                   <m:oMathPara xmlns:m="http://schemas.openxmlformats.org/officeDocument/2006/math">
                     <m:oMathParaPr>
@@ -9188,7 +9203,7 @@
             </p:txBody>
           </p:sp>
         </mc:Choice>
-        <mc:Fallback>
+        <mc:Fallback xmlns="">
           <p:sp>
             <p:nvSpPr>
               <p:cNvPr id="61" name="TextBox 60">
@@ -9413,8 +9428,8 @@
           </a:fontRef>
         </p:style>
       </p:cxnSp>
-      <mc:AlternateContent xmlns:mc="http://schemas.openxmlformats.org/markup-compatibility/2006">
-        <mc:Choice xmlns:a14="http://schemas.microsoft.com/office/drawing/2010/main" Requires="a14">
+      <mc:AlternateContent xmlns:mc="http://schemas.openxmlformats.org/markup-compatibility/2006" xmlns:a14="http://schemas.microsoft.com/office/drawing/2010/main">
+        <mc:Choice Requires="a14">
           <p:sp>
             <p:nvSpPr>
               <p:cNvPr id="70" name="TextBox 69">
@@ -9443,6 +9458,7 @@
               </a:bodyPr>
               <a:lstStyle/>
               <a:p>
+                <a:pPr/>
                 <a14:m>
                   <m:oMathPara xmlns:m="http://schemas.openxmlformats.org/officeDocument/2006/math">
                     <m:oMathParaPr>
@@ -9497,7 +9513,7 @@
             </p:txBody>
           </p:sp>
         </mc:Choice>
-        <mc:Fallback>
+        <mc:Fallback xmlns="">
           <p:sp>
             <p:nvSpPr>
               <p:cNvPr id="70" name="TextBox 69">
@@ -9542,8 +9558,8 @@
           </p:sp>
         </mc:Fallback>
       </mc:AlternateContent>
-      <mc:AlternateContent xmlns:mc="http://schemas.openxmlformats.org/markup-compatibility/2006">
-        <mc:Choice xmlns:a14="http://schemas.microsoft.com/office/drawing/2010/main" Requires="a14">
+      <mc:AlternateContent xmlns:mc="http://schemas.openxmlformats.org/markup-compatibility/2006" xmlns:a14="http://schemas.microsoft.com/office/drawing/2010/main">
+        <mc:Choice Requires="a14">
           <p:sp>
             <p:nvSpPr>
               <p:cNvPr id="71" name="TextBox 70">
@@ -9572,6 +9588,7 @@
               </a:bodyPr>
               <a:lstStyle/>
               <a:p>
+                <a:pPr/>
                 <a14:m>
                   <m:oMathPara xmlns:m="http://schemas.openxmlformats.org/officeDocument/2006/math">
                     <m:oMathParaPr>
@@ -9626,7 +9643,7 @@
             </p:txBody>
           </p:sp>
         </mc:Choice>
-        <mc:Fallback>
+        <mc:Fallback xmlns="">
           <p:sp>
             <p:nvSpPr>
               <p:cNvPr id="71" name="TextBox 70">
@@ -9716,8 +9733,8 @@
           </a:fontRef>
         </p:style>
       </p:cxnSp>
-      <mc:AlternateContent xmlns:mc="http://schemas.openxmlformats.org/markup-compatibility/2006">
-        <mc:Choice xmlns:a14="http://schemas.microsoft.com/office/drawing/2010/main" Requires="a14">
+      <mc:AlternateContent xmlns:mc="http://schemas.openxmlformats.org/markup-compatibility/2006" xmlns:a14="http://schemas.microsoft.com/office/drawing/2010/main">
+        <mc:Choice Requires="a14">
           <p:sp>
             <p:nvSpPr>
               <p:cNvPr id="73" name="TextBox 72">
@@ -9746,6 +9763,7 @@
               </a:bodyPr>
               <a:lstStyle/>
               <a:p>
+                <a:pPr/>
                 <a14:m>
                   <m:oMathPara xmlns:m="http://schemas.openxmlformats.org/officeDocument/2006/math">
                     <m:oMathParaPr>
@@ -9800,7 +9818,7 @@
             </p:txBody>
           </p:sp>
         </mc:Choice>
-        <mc:Fallback>
+        <mc:Fallback xmlns="">
           <p:sp>
             <p:nvSpPr>
               <p:cNvPr id="73" name="TextBox 72">
@@ -11163,8 +11181,8 @@
           </a:p>
         </p:txBody>
       </p:sp>
-      <mc:AlternateContent xmlns:mc="http://schemas.openxmlformats.org/markup-compatibility/2006">
-        <mc:Choice xmlns:a14="http://schemas.microsoft.com/office/drawing/2010/main" Requires="a14">
+      <mc:AlternateContent xmlns:mc="http://schemas.openxmlformats.org/markup-compatibility/2006" xmlns:a14="http://schemas.microsoft.com/office/drawing/2010/main">
+        <mc:Choice Requires="a14">
           <p:sp>
             <p:nvSpPr>
               <p:cNvPr id="10" name="TextBox 9">
@@ -11225,7 +11243,7 @@
             </p:txBody>
           </p:sp>
         </mc:Choice>
-        <mc:Fallback>
+        <mc:Fallback xmlns="">
           <p:sp>
             <p:nvSpPr>
               <p:cNvPr id="10" name="TextBox 9">
@@ -11270,8 +11288,8 @@
           </p:sp>
         </mc:Fallback>
       </mc:AlternateContent>
-      <mc:AlternateContent xmlns:mc="http://schemas.openxmlformats.org/markup-compatibility/2006">
-        <mc:Choice xmlns:a14="http://schemas.microsoft.com/office/drawing/2010/main" Requires="a14">
+      <mc:AlternateContent xmlns:mc="http://schemas.openxmlformats.org/markup-compatibility/2006" xmlns:a14="http://schemas.microsoft.com/office/drawing/2010/main">
+        <mc:Choice Requires="a14">
           <p:sp>
             <p:nvSpPr>
               <p:cNvPr id="11" name="TextBox 10">
@@ -11332,7 +11350,7 @@
             </p:txBody>
           </p:sp>
         </mc:Choice>
-        <mc:Fallback>
+        <mc:Fallback xmlns="">
           <p:sp>
             <p:nvSpPr>
               <p:cNvPr id="11" name="TextBox 10">
@@ -11764,8 +11782,8 @@
             </a:fontRef>
           </p:style>
         </p:cxnSp>
-        <mc:AlternateContent xmlns:mc="http://schemas.openxmlformats.org/markup-compatibility/2006">
-          <mc:Choice xmlns:a14="http://schemas.microsoft.com/office/drawing/2010/main" Requires="a14">
+        <mc:AlternateContent xmlns:mc="http://schemas.openxmlformats.org/markup-compatibility/2006" xmlns:a14="http://schemas.microsoft.com/office/drawing/2010/main">
+          <mc:Choice Requires="a14">
             <p:sp>
               <p:nvSpPr>
                 <p:cNvPr id="22" name="TextBox 21">
@@ -11794,6 +11812,7 @@
                 </a:bodyPr>
                 <a:lstStyle/>
                 <a:p>
+                  <a:pPr/>
                   <a14:m>
                     <m:oMathPara xmlns:m="http://schemas.openxmlformats.org/officeDocument/2006/math">
                       <m:oMathParaPr>
@@ -11833,7 +11852,7 @@
               </p:txBody>
             </p:sp>
           </mc:Choice>
-          <mc:Fallback>
+          <mc:Fallback xmlns="">
             <p:sp>
               <p:nvSpPr>
                 <p:cNvPr id="22" name="TextBox 21">
@@ -11878,8 +11897,8 @@
             </p:sp>
           </mc:Fallback>
         </mc:AlternateContent>
-        <mc:AlternateContent xmlns:mc="http://schemas.openxmlformats.org/markup-compatibility/2006">
-          <mc:Choice xmlns:a14="http://schemas.microsoft.com/office/drawing/2010/main" Requires="a14">
+        <mc:AlternateContent xmlns:mc="http://schemas.openxmlformats.org/markup-compatibility/2006" xmlns:a14="http://schemas.microsoft.com/office/drawing/2010/main">
+          <mc:Choice Requires="a14">
             <p:sp>
               <p:nvSpPr>
                 <p:cNvPr id="23" name="TextBox 22">
@@ -11908,6 +11927,7 @@
                 </a:bodyPr>
                 <a:lstStyle/>
                 <a:p>
+                  <a:pPr/>
                   <a14:m>
                     <m:oMathPara xmlns:m="http://schemas.openxmlformats.org/officeDocument/2006/math">
                       <m:oMathParaPr>
@@ -11947,7 +11967,7 @@
               </p:txBody>
             </p:sp>
           </mc:Choice>
-          <mc:Fallback>
+          <mc:Fallback xmlns="">
             <p:sp>
               <p:nvSpPr>
                 <p:cNvPr id="23" name="TextBox 22">
@@ -12095,8 +12115,8 @@
             </a:fontRef>
           </p:style>
         </p:cxnSp>
-        <mc:AlternateContent xmlns:mc="http://schemas.openxmlformats.org/markup-compatibility/2006">
-          <mc:Choice xmlns:a14="http://schemas.microsoft.com/office/drawing/2010/main" Requires="a14">
+        <mc:AlternateContent xmlns:mc="http://schemas.openxmlformats.org/markup-compatibility/2006" xmlns:a14="http://schemas.microsoft.com/office/drawing/2010/main">
+          <mc:Choice Requires="a14">
             <p:sp>
               <p:nvSpPr>
                 <p:cNvPr id="27" name="TextBox 26">
@@ -12125,6 +12145,7 @@
                 </a:bodyPr>
                 <a:lstStyle/>
                 <a:p>
+                  <a:pPr/>
                   <a14:m>
                     <m:oMathPara xmlns:m="http://schemas.openxmlformats.org/officeDocument/2006/math">
                       <m:oMathParaPr>
@@ -12145,7 +12166,7 @@
               </p:txBody>
             </p:sp>
           </mc:Choice>
-          <mc:Fallback>
+          <mc:Fallback xmlns="">
             <p:sp>
               <p:nvSpPr>
                 <p:cNvPr id="27" name="TextBox 26">
@@ -12190,8 +12211,8 @@
             </p:sp>
           </mc:Fallback>
         </mc:AlternateContent>
-        <mc:AlternateContent xmlns:mc="http://schemas.openxmlformats.org/markup-compatibility/2006">
-          <mc:Choice xmlns:a14="http://schemas.microsoft.com/office/drawing/2010/main" Requires="a14">
+        <mc:AlternateContent xmlns:mc="http://schemas.openxmlformats.org/markup-compatibility/2006" xmlns:a14="http://schemas.microsoft.com/office/drawing/2010/main">
+          <mc:Choice Requires="a14">
             <p:sp>
               <p:nvSpPr>
                 <p:cNvPr id="28" name="TextBox 27">
@@ -12220,6 +12241,7 @@
                 </a:bodyPr>
                 <a:lstStyle/>
                 <a:p>
+                  <a:pPr/>
                   <a14:m>
                     <m:oMathPara xmlns:m="http://schemas.openxmlformats.org/officeDocument/2006/math">
                       <m:oMathParaPr>
@@ -12240,7 +12262,7 @@
               </p:txBody>
             </p:sp>
           </mc:Choice>
-          <mc:Fallback>
+          <mc:Fallback xmlns="">
             <p:sp>
               <p:nvSpPr>
                 <p:cNvPr id="28" name="TextBox 27">
@@ -12423,8 +12445,8 @@
             </a:fontRef>
           </p:style>
         </p:cxnSp>
-        <mc:AlternateContent xmlns:mc="http://schemas.openxmlformats.org/markup-compatibility/2006">
-          <mc:Choice xmlns:a14="http://schemas.microsoft.com/office/drawing/2010/main" Requires="a14">
+        <mc:AlternateContent xmlns:mc="http://schemas.openxmlformats.org/markup-compatibility/2006" xmlns:a14="http://schemas.microsoft.com/office/drawing/2010/main">
+          <mc:Choice Requires="a14">
             <p:sp>
               <p:nvSpPr>
                 <p:cNvPr id="33" name="TextBox 32">
@@ -12453,6 +12475,7 @@
                 </a:bodyPr>
                 <a:lstStyle/>
                 <a:p>
+                  <a:pPr/>
                   <a14:m>
                     <m:oMathPara xmlns:m="http://schemas.openxmlformats.org/officeDocument/2006/math">
                       <m:oMathParaPr>
@@ -12492,7 +12515,7 @@
               </p:txBody>
             </p:sp>
           </mc:Choice>
-          <mc:Fallback>
+          <mc:Fallback xmlns="">
             <p:sp>
               <p:nvSpPr>
                 <p:cNvPr id="33" name="TextBox 32">
@@ -12537,8 +12560,8 @@
             </p:sp>
           </mc:Fallback>
         </mc:AlternateContent>
-        <mc:AlternateContent xmlns:mc="http://schemas.openxmlformats.org/markup-compatibility/2006">
-          <mc:Choice xmlns:a14="http://schemas.microsoft.com/office/drawing/2010/main" Requires="a14">
+        <mc:AlternateContent xmlns:mc="http://schemas.openxmlformats.org/markup-compatibility/2006" xmlns:a14="http://schemas.microsoft.com/office/drawing/2010/main">
+          <mc:Choice Requires="a14">
             <p:sp>
               <p:nvSpPr>
                 <p:cNvPr id="34" name="TextBox 33">
@@ -12567,6 +12590,7 @@
                 </a:bodyPr>
                 <a:lstStyle/>
                 <a:p>
+                  <a:pPr/>
                   <a14:m>
                     <m:oMathPara xmlns:m="http://schemas.openxmlformats.org/officeDocument/2006/math">
                       <m:oMathParaPr>
@@ -12606,7 +12630,7 @@
               </p:txBody>
             </p:sp>
           </mc:Choice>
-          <mc:Fallback>
+          <mc:Fallback xmlns="">
             <p:sp>
               <p:nvSpPr>
                 <p:cNvPr id="34" name="TextBox 33">
@@ -12703,8 +12727,8 @@
           </a:p>
         </p:txBody>
       </p:sp>
-      <mc:AlternateContent xmlns:mc="http://schemas.openxmlformats.org/markup-compatibility/2006">
-        <mc:Choice xmlns:a14="http://schemas.microsoft.com/office/drawing/2010/main" Requires="a14">
+      <mc:AlternateContent xmlns:mc="http://schemas.openxmlformats.org/markup-compatibility/2006" xmlns:a14="http://schemas.microsoft.com/office/drawing/2010/main">
+        <mc:Choice Requires="a14">
           <p:sp>
             <p:nvSpPr>
               <p:cNvPr id="36" name="TextBox 35">
@@ -12824,7 +12848,7 @@
             </p:txBody>
           </p:sp>
         </mc:Choice>
-        <mc:Fallback>
+        <mc:Fallback xmlns="">
           <p:sp>
             <p:nvSpPr>
               <p:cNvPr id="36" name="TextBox 35">
@@ -12920,8 +12944,8 @@
           </a:p>
         </p:txBody>
       </p:sp>
-      <mc:AlternateContent xmlns:mc="http://schemas.openxmlformats.org/markup-compatibility/2006">
-        <mc:Choice xmlns:a14="http://schemas.microsoft.com/office/drawing/2010/main" Requires="a14">
+      <mc:AlternateContent xmlns:mc="http://schemas.openxmlformats.org/markup-compatibility/2006" xmlns:a14="http://schemas.microsoft.com/office/drawing/2010/main">
+        <mc:Choice Requires="a14">
           <p:sp>
             <p:nvSpPr>
               <p:cNvPr id="39" name="TextBox 38">
@@ -13047,7 +13071,7 @@
             </p:txBody>
           </p:sp>
         </mc:Choice>
-        <mc:Fallback>
+        <mc:Fallback xmlns="">
           <p:sp>
             <p:nvSpPr>
               <p:cNvPr id="39" name="TextBox 38">
@@ -13092,8 +13116,8 @@
           </p:sp>
         </mc:Fallback>
       </mc:AlternateContent>
-      <mc:AlternateContent xmlns:mc="http://schemas.openxmlformats.org/markup-compatibility/2006">
-        <mc:Choice xmlns:a14="http://schemas.microsoft.com/office/drawing/2010/main" Requires="a14">
+      <mc:AlternateContent xmlns:mc="http://schemas.openxmlformats.org/markup-compatibility/2006" xmlns:a14="http://schemas.microsoft.com/office/drawing/2010/main">
+        <mc:Choice Requires="a14">
           <p:sp>
             <p:nvSpPr>
               <p:cNvPr id="40" name="TextBox 39">
@@ -13122,6 +13146,7 @@
               </a:bodyPr>
               <a:lstStyle/>
               <a:p>
+                <a:pPr/>
                 <a14:m>
                   <m:oMathPara xmlns:m="http://schemas.openxmlformats.org/officeDocument/2006/math">
                     <m:oMathParaPr>
@@ -13418,7 +13443,7 @@
             </p:txBody>
           </p:sp>
         </mc:Choice>
-        <mc:Fallback>
+        <mc:Fallback xmlns="">
           <p:sp>
             <p:nvSpPr>
               <p:cNvPr id="40" name="TextBox 39">
@@ -13463,8 +13488,8 @@
           </p:sp>
         </mc:Fallback>
       </mc:AlternateContent>
-      <mc:AlternateContent xmlns:mc="http://schemas.openxmlformats.org/markup-compatibility/2006">
-        <mc:Choice xmlns:a14="http://schemas.microsoft.com/office/drawing/2010/main" Requires="a14">
+      <mc:AlternateContent xmlns:mc="http://schemas.openxmlformats.org/markup-compatibility/2006" xmlns:a14="http://schemas.microsoft.com/office/drawing/2010/main">
+        <mc:Choice Requires="a14">
           <p:sp>
             <p:nvSpPr>
               <p:cNvPr id="41" name="TextBox 40">
@@ -13493,6 +13518,7 @@
               </a:bodyPr>
               <a:lstStyle/>
               <a:p>
+                <a:pPr/>
                 <a14:m>
                   <m:oMathPara xmlns:m="http://schemas.openxmlformats.org/officeDocument/2006/math">
                     <m:oMathParaPr>
@@ -13965,7 +13991,7 @@
             </p:txBody>
           </p:sp>
         </mc:Choice>
-        <mc:Fallback>
+        <mc:Fallback xmlns="">
           <p:sp>
             <p:nvSpPr>
               <p:cNvPr id="41" name="TextBox 40">
@@ -14010,8 +14036,8 @@
           </p:sp>
         </mc:Fallback>
       </mc:AlternateContent>
-      <mc:AlternateContent xmlns:mc="http://schemas.openxmlformats.org/markup-compatibility/2006">
-        <mc:Choice xmlns:a14="http://schemas.microsoft.com/office/drawing/2010/main" Requires="a14">
+      <mc:AlternateContent xmlns:mc="http://schemas.openxmlformats.org/markup-compatibility/2006" xmlns:a14="http://schemas.microsoft.com/office/drawing/2010/main">
+        <mc:Choice Requires="a14">
           <p:sp>
             <p:nvSpPr>
               <p:cNvPr id="42" name="TextBox 41">
@@ -14050,7 +14076,7 @@
                       <m:sSub>
                         <m:sSubPr>
                           <m:ctrlPr>
-                            <a:rPr lang="en-CA" sz="2000" b="0" i="0" smtClean="0">
+                            <a:rPr lang="en-CA" sz="2000" b="0" i="1" smtClean="0">
                               <a:solidFill>
                                 <a:schemeClr val="accent1"/>
                               </a:solidFill>
@@ -14122,7 +14148,7 @@
             </p:txBody>
           </p:sp>
         </mc:Choice>
-        <mc:Fallback>
+        <mc:Fallback xmlns="">
           <p:sp>
             <p:nvSpPr>
               <p:cNvPr id="42" name="TextBox 41">
@@ -14167,8 +14193,8 @@
           </p:sp>
         </mc:Fallback>
       </mc:AlternateContent>
-      <mc:AlternateContent xmlns:mc="http://schemas.openxmlformats.org/markup-compatibility/2006">
-        <mc:Choice xmlns:a14="http://schemas.microsoft.com/office/drawing/2010/main" Requires="a14">
+      <mc:AlternateContent xmlns:mc="http://schemas.openxmlformats.org/markup-compatibility/2006" xmlns:a14="http://schemas.microsoft.com/office/drawing/2010/main">
+        <mc:Choice Requires="a14">
           <p:sp>
             <p:nvSpPr>
               <p:cNvPr id="43" name="TextBox 42">
@@ -14207,7 +14233,7 @@
                       <m:sSub>
                         <m:sSubPr>
                           <m:ctrlPr>
-                            <a:rPr lang="en-CA" sz="2000" b="0" i="0" smtClean="0">
+                            <a:rPr lang="en-CA" sz="2000" b="0" i="1" smtClean="0">
                               <a:solidFill>
                                 <a:schemeClr val="accent1"/>
                               </a:solidFill>
@@ -14279,7 +14305,7 @@
             </p:txBody>
           </p:sp>
         </mc:Choice>
-        <mc:Fallback>
+        <mc:Fallback xmlns="">
           <p:sp>
             <p:nvSpPr>
               <p:cNvPr id="43" name="TextBox 42">
@@ -14378,8 +14404,8 @@
           </a:p>
         </p:txBody>
       </p:sp>
-      <mc:AlternateContent xmlns:mc="http://schemas.openxmlformats.org/markup-compatibility/2006">
-        <mc:Choice xmlns:a14="http://schemas.microsoft.com/office/drawing/2010/main" Requires="a14">
+      <mc:AlternateContent xmlns:mc="http://schemas.openxmlformats.org/markup-compatibility/2006" xmlns:a14="http://schemas.microsoft.com/office/drawing/2010/main">
+        <mc:Choice Requires="a14">
           <p:sp>
             <p:nvSpPr>
               <p:cNvPr id="3" name="Content Placeholder 2"/>
@@ -14528,7 +14554,7 @@
             </p:txBody>
           </p:sp>
         </mc:Choice>
-        <mc:Fallback>
+        <mc:Fallback xmlns="">
           <p:sp>
             <p:nvSpPr>
               <p:cNvPr id="3" name="Content Placeholder 2"/>
@@ -16719,6 +16745,1291 @@
       </p:grpSpPr>
       <p:sp>
         <p:nvSpPr>
+          <p:cNvPr id="5" name="Rounded Rectangle 5">
+            <a:extLst>
+              <a:ext uri="{FF2B5EF4-FFF2-40B4-BE49-F238E27FC236}">
+                <a16:creationId xmlns:a16="http://schemas.microsoft.com/office/drawing/2014/main" id="{1D94D3CD-4B37-7D49-B5C5-C88123842727}"/>
+              </a:ext>
+            </a:extLst>
+          </p:cNvPr>
+          <p:cNvSpPr/>
+          <p:nvPr/>
+        </p:nvSpPr>
+        <p:spPr>
+          <a:xfrm>
+            <a:off x="1515794" y="2760399"/>
+            <a:ext cx="1828800" cy="1006929"/>
+          </a:xfrm>
+          <a:prstGeom prst="roundRect">
+            <a:avLst>
+              <a:gd name="adj" fmla="val 50000"/>
+            </a:avLst>
+          </a:prstGeom>
+        </p:spPr>
+        <p:style>
+          <a:lnRef idx="2">
+            <a:schemeClr val="accent6">
+              <a:shade val="50000"/>
+            </a:schemeClr>
+          </a:lnRef>
+          <a:fillRef idx="1">
+            <a:schemeClr val="accent6"/>
+          </a:fillRef>
+          <a:effectRef idx="0">
+            <a:schemeClr val="accent6"/>
+          </a:effectRef>
+          <a:fontRef idx="minor">
+            <a:schemeClr val="lt1"/>
+          </a:fontRef>
+        </p:style>
+        <p:txBody>
+          <a:bodyPr rtlCol="0" anchor="ctr"/>
+          <a:lstStyle/>
+          <a:p>
+            <a:pPr algn="ctr"/>
+            <a:endParaRPr lang="en-US"/>
+          </a:p>
+        </p:txBody>
+      </p:sp>
+      <p:sp>
+        <p:nvSpPr>
+          <p:cNvPr id="6" name="Rounded Rectangle 5">
+            <a:extLst>
+              <a:ext uri="{FF2B5EF4-FFF2-40B4-BE49-F238E27FC236}">
+                <a16:creationId xmlns:a16="http://schemas.microsoft.com/office/drawing/2014/main" id="{A5F1B29B-4E95-624E-A078-2F30560FB343}"/>
+              </a:ext>
+            </a:extLst>
+          </p:cNvPr>
+          <p:cNvSpPr/>
+          <p:nvPr/>
+        </p:nvSpPr>
+        <p:spPr>
+          <a:xfrm>
+            <a:off x="2539051" y="2997164"/>
+            <a:ext cx="3429000" cy="533400"/>
+          </a:xfrm>
+          <a:prstGeom prst="roundRect">
+            <a:avLst>
+              <a:gd name="adj" fmla="val 50000"/>
+            </a:avLst>
+          </a:prstGeom>
+          <a:solidFill>
+            <a:srgbClr val="FFFF00"/>
+          </a:solidFill>
+        </p:spPr>
+        <p:style>
+          <a:lnRef idx="2">
+            <a:schemeClr val="accent6">
+              <a:shade val="50000"/>
+            </a:schemeClr>
+          </a:lnRef>
+          <a:fillRef idx="1">
+            <a:schemeClr val="accent6"/>
+          </a:fillRef>
+          <a:effectRef idx="0">
+            <a:schemeClr val="accent6"/>
+          </a:effectRef>
+          <a:fontRef idx="minor">
+            <a:schemeClr val="lt1"/>
+          </a:fontRef>
+        </p:style>
+        <p:txBody>
+          <a:bodyPr rtlCol="0" anchor="ctr"/>
+          <a:lstStyle/>
+          <a:p>
+            <a:pPr algn="ctr"/>
+            <a:endParaRPr lang="en-US"/>
+          </a:p>
+        </p:txBody>
+      </p:sp>
+      <p:sp>
+        <p:nvSpPr>
+          <p:cNvPr id="7" name="Rounded Rectangle 6">
+            <a:extLst>
+              <a:ext uri="{FF2B5EF4-FFF2-40B4-BE49-F238E27FC236}">
+                <a16:creationId xmlns:a16="http://schemas.microsoft.com/office/drawing/2014/main" id="{5D730EC3-2251-F24B-82EA-803A0845CEFF}"/>
+              </a:ext>
+            </a:extLst>
+          </p:cNvPr>
+          <p:cNvSpPr/>
+          <p:nvPr/>
+        </p:nvSpPr>
+        <p:spPr>
+          <a:xfrm rot="1726745">
+            <a:off x="5346299" y="3575490"/>
+            <a:ext cx="2580866" cy="430769"/>
+          </a:xfrm>
+          <a:prstGeom prst="roundRect">
+            <a:avLst>
+              <a:gd name="adj" fmla="val 50000"/>
+            </a:avLst>
+          </a:prstGeom>
+          <a:solidFill>
+            <a:srgbClr val="FFFF00"/>
+          </a:solidFill>
+        </p:spPr>
+        <p:style>
+          <a:lnRef idx="2">
+            <a:schemeClr val="accent6">
+              <a:shade val="50000"/>
+            </a:schemeClr>
+          </a:lnRef>
+          <a:fillRef idx="1">
+            <a:schemeClr val="accent6"/>
+          </a:fillRef>
+          <a:effectRef idx="0">
+            <a:schemeClr val="accent6"/>
+          </a:effectRef>
+          <a:fontRef idx="minor">
+            <a:schemeClr val="lt1"/>
+          </a:fontRef>
+        </p:style>
+        <p:txBody>
+          <a:bodyPr rtlCol="0" anchor="ctr"/>
+          <a:lstStyle/>
+          <a:p>
+            <a:pPr algn="ctr"/>
+            <a:endParaRPr lang="en-US"/>
+          </a:p>
+        </p:txBody>
+      </p:sp>
+      <p:sp>
+        <p:nvSpPr>
+          <p:cNvPr id="8" name="Rounded Rectangle 7">
+            <a:extLst>
+              <a:ext uri="{FF2B5EF4-FFF2-40B4-BE49-F238E27FC236}">
+                <a16:creationId xmlns:a16="http://schemas.microsoft.com/office/drawing/2014/main" id="{3A27092B-B475-094A-8469-594F62E8DA54}"/>
+              </a:ext>
+            </a:extLst>
+          </p:cNvPr>
+          <p:cNvSpPr/>
+          <p:nvPr/>
+        </p:nvSpPr>
+        <p:spPr>
+          <a:xfrm>
+            <a:off x="2726286" y="3172423"/>
+            <a:ext cx="182880" cy="182880"/>
+          </a:xfrm>
+          <a:prstGeom prst="roundRect">
+            <a:avLst>
+              <a:gd name="adj" fmla="val 50000"/>
+            </a:avLst>
+          </a:prstGeom>
+        </p:spPr>
+        <p:style>
+          <a:lnRef idx="2">
+            <a:schemeClr val="dk1">
+              <a:shade val="50000"/>
+            </a:schemeClr>
+          </a:lnRef>
+          <a:fillRef idx="1">
+            <a:schemeClr val="dk1"/>
+          </a:fillRef>
+          <a:effectRef idx="0">
+            <a:schemeClr val="dk1"/>
+          </a:effectRef>
+          <a:fontRef idx="minor">
+            <a:schemeClr val="lt1"/>
+          </a:fontRef>
+        </p:style>
+        <p:txBody>
+          <a:bodyPr rtlCol="0" anchor="ctr"/>
+          <a:lstStyle/>
+          <a:p>
+            <a:pPr algn="ctr"/>
+            <a:endParaRPr lang="en-US"/>
+          </a:p>
+        </p:txBody>
+      </p:sp>
+      <p:sp>
+        <p:nvSpPr>
+          <p:cNvPr id="9" name="Rounded Rectangle 8">
+            <a:extLst>
+              <a:ext uri="{FF2B5EF4-FFF2-40B4-BE49-F238E27FC236}">
+                <a16:creationId xmlns:a16="http://schemas.microsoft.com/office/drawing/2014/main" id="{AA905851-988A-D54A-BE85-50E9ACF5A8A3}"/>
+              </a:ext>
+            </a:extLst>
+          </p:cNvPr>
+          <p:cNvSpPr/>
+          <p:nvPr/>
+        </p:nvSpPr>
+        <p:spPr>
+          <a:xfrm>
+            <a:off x="5600114" y="3155007"/>
+            <a:ext cx="182880" cy="182880"/>
+          </a:xfrm>
+          <a:prstGeom prst="roundRect">
+            <a:avLst>
+              <a:gd name="adj" fmla="val 50000"/>
+            </a:avLst>
+          </a:prstGeom>
+        </p:spPr>
+        <p:style>
+          <a:lnRef idx="2">
+            <a:schemeClr val="dk1">
+              <a:shade val="50000"/>
+            </a:schemeClr>
+          </a:lnRef>
+          <a:fillRef idx="1">
+            <a:schemeClr val="dk1"/>
+          </a:fillRef>
+          <a:effectRef idx="0">
+            <a:schemeClr val="dk1"/>
+          </a:effectRef>
+          <a:fontRef idx="minor">
+            <a:schemeClr val="lt1"/>
+          </a:fontRef>
+        </p:style>
+        <p:txBody>
+          <a:bodyPr rtlCol="0" anchor="ctr"/>
+          <a:lstStyle/>
+          <a:p>
+            <a:pPr algn="ctr"/>
+            <a:endParaRPr lang="en-US"/>
+          </a:p>
+        </p:txBody>
+      </p:sp>
+      <p:cxnSp>
+        <p:nvCxnSpPr>
+          <p:cNvPr id="10" name="Straight Connector 9">
+            <a:extLst>
+              <a:ext uri="{FF2B5EF4-FFF2-40B4-BE49-F238E27FC236}">
+                <a16:creationId xmlns:a16="http://schemas.microsoft.com/office/drawing/2014/main" id="{6F989E1C-E4D9-C946-9F91-EAC146019166}"/>
+              </a:ext>
+            </a:extLst>
+          </p:cNvPr>
+          <p:cNvCxnSpPr/>
+          <p:nvPr/>
+        </p:nvCxnSpPr>
+        <p:spPr>
+          <a:xfrm flipV="1">
+            <a:off x="2817726" y="2218835"/>
+            <a:ext cx="0" cy="838200"/>
+          </a:xfrm>
+          <a:prstGeom prst="line">
+            <a:avLst/>
+          </a:prstGeom>
+        </p:spPr>
+        <p:style>
+          <a:lnRef idx="1">
+            <a:schemeClr val="accent1"/>
+          </a:lnRef>
+          <a:fillRef idx="0">
+            <a:schemeClr val="accent1"/>
+          </a:fillRef>
+          <a:effectRef idx="0">
+            <a:schemeClr val="accent1"/>
+          </a:effectRef>
+          <a:fontRef idx="minor">
+            <a:schemeClr val="tx1"/>
+          </a:fontRef>
+        </p:style>
+      </p:cxnSp>
+      <p:cxnSp>
+        <p:nvCxnSpPr>
+          <p:cNvPr id="11" name="Straight Connector 10">
+            <a:extLst>
+              <a:ext uri="{FF2B5EF4-FFF2-40B4-BE49-F238E27FC236}">
+                <a16:creationId xmlns:a16="http://schemas.microsoft.com/office/drawing/2014/main" id="{ECCBD913-EC5A-2D45-9BA6-6D3CF120DAC4}"/>
+              </a:ext>
+            </a:extLst>
+          </p:cNvPr>
+          <p:cNvCxnSpPr/>
+          <p:nvPr/>
+        </p:nvCxnSpPr>
+        <p:spPr>
+          <a:xfrm flipV="1">
+            <a:off x="5691554" y="2218835"/>
+            <a:ext cx="0" cy="838200"/>
+          </a:xfrm>
+          <a:prstGeom prst="line">
+            <a:avLst/>
+          </a:prstGeom>
+        </p:spPr>
+        <p:style>
+          <a:lnRef idx="1">
+            <a:schemeClr val="accent1"/>
+          </a:lnRef>
+          <a:fillRef idx="0">
+            <a:schemeClr val="accent1"/>
+          </a:fillRef>
+          <a:effectRef idx="0">
+            <a:schemeClr val="accent1"/>
+          </a:effectRef>
+          <a:fontRef idx="minor">
+            <a:schemeClr val="tx1"/>
+          </a:fontRef>
+        </p:style>
+      </p:cxnSp>
+      <p:cxnSp>
+        <p:nvCxnSpPr>
+          <p:cNvPr id="12" name="Straight Connector 11">
+            <a:extLst>
+              <a:ext uri="{FF2B5EF4-FFF2-40B4-BE49-F238E27FC236}">
+                <a16:creationId xmlns:a16="http://schemas.microsoft.com/office/drawing/2014/main" id="{61677C34-B337-504B-9A54-C54196B20C34}"/>
+              </a:ext>
+            </a:extLst>
+          </p:cNvPr>
+          <p:cNvCxnSpPr/>
+          <p:nvPr/>
+        </p:nvCxnSpPr>
+        <p:spPr>
+          <a:xfrm rot="16200000">
+            <a:off x="5050821" y="3430861"/>
+            <a:ext cx="772374" cy="447087"/>
+          </a:xfrm>
+          <a:prstGeom prst="line">
+            <a:avLst/>
+          </a:prstGeom>
+        </p:spPr>
+        <p:style>
+          <a:lnRef idx="1">
+            <a:schemeClr val="accent1"/>
+          </a:lnRef>
+          <a:fillRef idx="0">
+            <a:schemeClr val="accent1"/>
+          </a:fillRef>
+          <a:effectRef idx="0">
+            <a:schemeClr val="accent1"/>
+          </a:effectRef>
+          <a:fontRef idx="minor">
+            <a:schemeClr val="tx1"/>
+          </a:fontRef>
+        </p:style>
+      </p:cxnSp>
+      <p:cxnSp>
+        <p:nvCxnSpPr>
+          <p:cNvPr id="13" name="Straight Connector 12">
+            <a:extLst>
+              <a:ext uri="{FF2B5EF4-FFF2-40B4-BE49-F238E27FC236}">
+                <a16:creationId xmlns:a16="http://schemas.microsoft.com/office/drawing/2014/main" id="{30E66D92-C5BA-CC46-BAFD-1E4C65A20442}"/>
+              </a:ext>
+            </a:extLst>
+          </p:cNvPr>
+          <p:cNvCxnSpPr/>
+          <p:nvPr/>
+        </p:nvCxnSpPr>
+        <p:spPr>
+          <a:xfrm rot="16200000">
+            <a:off x="6915751" y="4461336"/>
+            <a:ext cx="772374" cy="447087"/>
+          </a:xfrm>
+          <a:prstGeom prst="line">
+            <a:avLst/>
+          </a:prstGeom>
+        </p:spPr>
+        <p:style>
+          <a:lnRef idx="1">
+            <a:schemeClr val="accent1"/>
+          </a:lnRef>
+          <a:fillRef idx="0">
+            <a:schemeClr val="accent1"/>
+          </a:fillRef>
+          <a:effectRef idx="0">
+            <a:schemeClr val="accent1"/>
+          </a:effectRef>
+          <a:fontRef idx="minor">
+            <a:schemeClr val="tx1"/>
+          </a:fontRef>
+        </p:style>
+      </p:cxnSp>
+      <p:cxnSp>
+        <p:nvCxnSpPr>
+          <p:cNvPr id="14" name="Straight Connector 13">
+            <a:extLst>
+              <a:ext uri="{FF2B5EF4-FFF2-40B4-BE49-F238E27FC236}">
+                <a16:creationId xmlns:a16="http://schemas.microsoft.com/office/drawing/2014/main" id="{9ACF0DFE-C133-264B-9E53-282A8057E23C}"/>
+              </a:ext>
+            </a:extLst>
+          </p:cNvPr>
+          <p:cNvCxnSpPr/>
+          <p:nvPr/>
+        </p:nvCxnSpPr>
+        <p:spPr>
+          <a:xfrm>
+            <a:off x="5437008" y="3705165"/>
+            <a:ext cx="1833854" cy="990600"/>
+          </a:xfrm>
+          <a:prstGeom prst="line">
+            <a:avLst/>
+          </a:prstGeom>
+        </p:spPr>
+        <p:style>
+          <a:lnRef idx="1">
+            <a:schemeClr val="accent1"/>
+          </a:lnRef>
+          <a:fillRef idx="0">
+            <a:schemeClr val="accent1"/>
+          </a:fillRef>
+          <a:effectRef idx="0">
+            <a:schemeClr val="accent1"/>
+          </a:effectRef>
+          <a:fontRef idx="minor">
+            <a:schemeClr val="tx1"/>
+          </a:fontRef>
+        </p:style>
+      </p:cxnSp>
+      <p:cxnSp>
+        <p:nvCxnSpPr>
+          <p:cNvPr id="15" name="Straight Connector 14">
+            <a:extLst>
+              <a:ext uri="{FF2B5EF4-FFF2-40B4-BE49-F238E27FC236}">
+                <a16:creationId xmlns:a16="http://schemas.microsoft.com/office/drawing/2014/main" id="{CDD19323-51BC-1146-ADAD-F6B83233E1F0}"/>
+              </a:ext>
+            </a:extLst>
+          </p:cNvPr>
+          <p:cNvCxnSpPr/>
+          <p:nvPr/>
+        </p:nvCxnSpPr>
+        <p:spPr>
+          <a:xfrm>
+            <a:off x="2817726" y="2637935"/>
+            <a:ext cx="2873828" cy="0"/>
+          </a:xfrm>
+          <a:prstGeom prst="line">
+            <a:avLst/>
+          </a:prstGeom>
+        </p:spPr>
+        <p:style>
+          <a:lnRef idx="1">
+            <a:schemeClr val="accent1"/>
+          </a:lnRef>
+          <a:fillRef idx="0">
+            <a:schemeClr val="accent1"/>
+          </a:fillRef>
+          <a:effectRef idx="0">
+            <a:schemeClr val="accent1"/>
+          </a:effectRef>
+          <a:fontRef idx="minor">
+            <a:schemeClr val="tx1"/>
+          </a:fontRef>
+        </p:style>
+      </p:cxnSp>
+      <p:cxnSp>
+        <p:nvCxnSpPr>
+          <p:cNvPr id="16" name="Straight Connector 15">
+            <a:extLst>
+              <a:ext uri="{FF2B5EF4-FFF2-40B4-BE49-F238E27FC236}">
+                <a16:creationId xmlns:a16="http://schemas.microsoft.com/office/drawing/2014/main" id="{552A0521-E83F-1A4C-B7C2-9A272E312A5F}"/>
+              </a:ext>
+            </a:extLst>
+          </p:cNvPr>
+          <p:cNvCxnSpPr/>
+          <p:nvPr/>
+        </p:nvCxnSpPr>
+        <p:spPr>
+          <a:xfrm>
+            <a:off x="5843954" y="3246447"/>
+            <a:ext cx="1234440" cy="0"/>
+          </a:xfrm>
+          <a:prstGeom prst="line">
+            <a:avLst/>
+          </a:prstGeom>
+        </p:spPr>
+        <p:style>
+          <a:lnRef idx="1">
+            <a:schemeClr val="accent1"/>
+          </a:lnRef>
+          <a:fillRef idx="0">
+            <a:schemeClr val="accent1"/>
+          </a:fillRef>
+          <a:effectRef idx="0">
+            <a:schemeClr val="accent1"/>
+          </a:effectRef>
+          <a:fontRef idx="minor">
+            <a:schemeClr val="tx1"/>
+          </a:fontRef>
+        </p:style>
+      </p:cxnSp>
+      <p:cxnSp>
+        <p:nvCxnSpPr>
+          <p:cNvPr id="17" name="Straight Connector 16">
+            <a:extLst>
+              <a:ext uri="{FF2B5EF4-FFF2-40B4-BE49-F238E27FC236}">
+                <a16:creationId xmlns:a16="http://schemas.microsoft.com/office/drawing/2014/main" id="{AC6A404D-D15A-8048-BC2E-2312DAA9A77C}"/>
+              </a:ext>
+            </a:extLst>
+          </p:cNvPr>
+          <p:cNvCxnSpPr/>
+          <p:nvPr/>
+        </p:nvCxnSpPr>
+        <p:spPr>
+          <a:xfrm>
+            <a:off x="5832896" y="3337887"/>
+            <a:ext cx="1016898" cy="557348"/>
+          </a:xfrm>
+          <a:prstGeom prst="line">
+            <a:avLst/>
+          </a:prstGeom>
+        </p:spPr>
+        <p:style>
+          <a:lnRef idx="1">
+            <a:schemeClr val="accent1"/>
+          </a:lnRef>
+          <a:fillRef idx="0">
+            <a:schemeClr val="accent1"/>
+          </a:fillRef>
+          <a:effectRef idx="0">
+            <a:schemeClr val="accent1"/>
+          </a:effectRef>
+          <a:fontRef idx="minor">
+            <a:schemeClr val="tx1"/>
+          </a:fontRef>
+        </p:style>
+      </p:cxnSp>
+      <p:sp>
+        <p:nvSpPr>
+          <p:cNvPr id="18" name="Arc 17">
+            <a:extLst>
+              <a:ext uri="{FF2B5EF4-FFF2-40B4-BE49-F238E27FC236}">
+                <a16:creationId xmlns:a16="http://schemas.microsoft.com/office/drawing/2014/main" id="{0DF73A0C-289E-6A4E-8E00-718C9F4F611A}"/>
+              </a:ext>
+            </a:extLst>
+          </p:cNvPr>
+          <p:cNvSpPr/>
+          <p:nvPr/>
+        </p:nvSpPr>
+        <p:spPr>
+          <a:xfrm>
+            <a:off x="4777154" y="2349463"/>
+            <a:ext cx="1828800" cy="1828800"/>
+          </a:xfrm>
+          <a:prstGeom prst="arc">
+            <a:avLst>
+              <a:gd name="adj1" fmla="val 21563012"/>
+              <a:gd name="adj2" fmla="val 1671462"/>
+            </a:avLst>
+          </a:prstGeom>
+        </p:spPr>
+        <p:style>
+          <a:lnRef idx="1">
+            <a:schemeClr val="accent1"/>
+          </a:lnRef>
+          <a:fillRef idx="0">
+            <a:schemeClr val="accent1"/>
+          </a:fillRef>
+          <a:effectRef idx="0">
+            <a:schemeClr val="accent1"/>
+          </a:effectRef>
+          <a:fontRef idx="minor">
+            <a:schemeClr val="tx1"/>
+          </a:fontRef>
+        </p:style>
+        <p:txBody>
+          <a:bodyPr rtlCol="0" anchor="ctr"/>
+          <a:lstStyle/>
+          <a:p>
+            <a:pPr algn="ctr"/>
+            <a:endParaRPr lang="en-US"/>
+          </a:p>
+        </p:txBody>
+      </p:sp>
+      <p:sp>
+        <p:nvSpPr>
+          <p:cNvPr id="19" name="Arc 18">
+            <a:extLst>
+              <a:ext uri="{FF2B5EF4-FFF2-40B4-BE49-F238E27FC236}">
+                <a16:creationId xmlns:a16="http://schemas.microsoft.com/office/drawing/2014/main" id="{E71950CD-E835-8242-9EFF-DF2587299C99}"/>
+              </a:ext>
+            </a:extLst>
+          </p:cNvPr>
+          <p:cNvSpPr/>
+          <p:nvPr/>
+        </p:nvSpPr>
+        <p:spPr>
+          <a:xfrm flipH="1">
+            <a:off x="2360526" y="2806663"/>
+            <a:ext cx="914400" cy="914400"/>
+          </a:xfrm>
+          <a:prstGeom prst="arc">
+            <a:avLst>
+              <a:gd name="adj1" fmla="val 19211789"/>
+              <a:gd name="adj2" fmla="val 13869399"/>
+            </a:avLst>
+          </a:prstGeom>
+          <a:ln>
+            <a:solidFill>
+              <a:schemeClr val="accent1"/>
+            </a:solidFill>
+            <a:headEnd type="none" w="med" len="med"/>
+            <a:tailEnd type="arrow" w="med" len="med"/>
+          </a:ln>
+        </p:spPr>
+        <p:style>
+          <a:lnRef idx="2">
+            <a:schemeClr val="accent3"/>
+          </a:lnRef>
+          <a:fillRef idx="0">
+            <a:schemeClr val="accent3"/>
+          </a:fillRef>
+          <a:effectRef idx="1">
+            <a:schemeClr val="accent3"/>
+          </a:effectRef>
+          <a:fontRef idx="minor">
+            <a:schemeClr val="tx1"/>
+          </a:fontRef>
+        </p:style>
+        <p:txBody>
+          <a:bodyPr rtlCol="0" anchor="ctr"/>
+          <a:lstStyle/>
+          <a:p>
+            <a:pPr algn="ctr"/>
+            <a:endParaRPr lang="en-US">
+              <a:solidFill>
+                <a:srgbClr val="0070C0"/>
+              </a:solidFill>
+            </a:endParaRPr>
+          </a:p>
+        </p:txBody>
+      </p:sp>
+      <p:sp>
+        <p:nvSpPr>
+          <p:cNvPr id="20" name="TextBox 19">
+            <a:extLst>
+              <a:ext uri="{FF2B5EF4-FFF2-40B4-BE49-F238E27FC236}">
+                <a16:creationId xmlns:a16="http://schemas.microsoft.com/office/drawing/2014/main" id="{8E91CE12-3B6E-9144-B2A4-4C0EBEA76EF6}"/>
+              </a:ext>
+            </a:extLst>
+          </p:cNvPr>
+          <p:cNvSpPr txBox="1"/>
+          <p:nvPr/>
+        </p:nvSpPr>
+        <p:spPr>
+          <a:xfrm>
+            <a:off x="2398957" y="3754503"/>
+            <a:ext cx="837537" cy="369332"/>
+          </a:xfrm>
+          <a:prstGeom prst="rect">
+            <a:avLst/>
+          </a:prstGeom>
+          <a:noFill/>
+        </p:spPr>
+        <p:txBody>
+          <a:bodyPr wrap="none" rtlCol="0">
+            <a:spAutoFit/>
+          </a:bodyPr>
+          <a:lstStyle/>
+          <a:p>
+            <a:r>
+              <a:rPr lang="en-US" dirty="0">
+                <a:solidFill>
+                  <a:srgbClr val="0070C0"/>
+                </a:solidFill>
+              </a:rPr>
+              <a:t>5 rad/s</a:t>
+            </a:r>
+          </a:p>
+        </p:txBody>
+      </p:sp>
+      <p:sp>
+        <p:nvSpPr>
+          <p:cNvPr id="21" name="Arc 20">
+            <a:extLst>
+              <a:ext uri="{FF2B5EF4-FFF2-40B4-BE49-F238E27FC236}">
+                <a16:creationId xmlns:a16="http://schemas.microsoft.com/office/drawing/2014/main" id="{A9CCDEE4-D3D8-B641-88C7-C0DC0B643C12}"/>
+              </a:ext>
+            </a:extLst>
+          </p:cNvPr>
+          <p:cNvSpPr/>
+          <p:nvPr/>
+        </p:nvSpPr>
+        <p:spPr>
+          <a:xfrm flipH="1">
+            <a:off x="5234354" y="2790765"/>
+            <a:ext cx="914400" cy="914400"/>
+          </a:xfrm>
+          <a:prstGeom prst="arc">
+            <a:avLst>
+              <a:gd name="adj1" fmla="val 19211789"/>
+              <a:gd name="adj2" fmla="val 13869399"/>
+            </a:avLst>
+          </a:prstGeom>
+          <a:ln>
+            <a:solidFill>
+              <a:schemeClr val="accent1"/>
+            </a:solidFill>
+            <a:headEnd type="none" w="med" len="med"/>
+            <a:tailEnd type="arrow" w="med" len="med"/>
+          </a:ln>
+        </p:spPr>
+        <p:style>
+          <a:lnRef idx="2">
+            <a:schemeClr val="accent3"/>
+          </a:lnRef>
+          <a:fillRef idx="0">
+            <a:schemeClr val="accent3"/>
+          </a:fillRef>
+          <a:effectRef idx="1">
+            <a:schemeClr val="accent3"/>
+          </a:effectRef>
+          <a:fontRef idx="minor">
+            <a:schemeClr val="tx1"/>
+          </a:fontRef>
+        </p:style>
+        <p:txBody>
+          <a:bodyPr rtlCol="0" anchor="ctr"/>
+          <a:lstStyle/>
+          <a:p>
+            <a:pPr algn="ctr"/>
+            <a:endParaRPr lang="en-US">
+              <a:solidFill>
+                <a:srgbClr val="0070C0"/>
+              </a:solidFill>
+            </a:endParaRPr>
+          </a:p>
+        </p:txBody>
+      </p:sp>
+      <p:sp>
+        <p:nvSpPr>
+          <p:cNvPr id="22" name="TextBox 21">
+            <a:extLst>
+              <a:ext uri="{FF2B5EF4-FFF2-40B4-BE49-F238E27FC236}">
+                <a16:creationId xmlns:a16="http://schemas.microsoft.com/office/drawing/2014/main" id="{05F839F4-017F-C747-A905-DD1BFED09219}"/>
+              </a:ext>
+            </a:extLst>
+          </p:cNvPr>
+          <p:cNvSpPr txBox="1"/>
+          <p:nvPr/>
+        </p:nvSpPr>
+        <p:spPr>
+          <a:xfrm>
+            <a:off x="4375927" y="3622434"/>
+            <a:ext cx="837537" cy="369332"/>
+          </a:xfrm>
+          <a:prstGeom prst="rect">
+            <a:avLst/>
+          </a:prstGeom>
+          <a:noFill/>
+        </p:spPr>
+        <p:txBody>
+          <a:bodyPr wrap="none" rtlCol="0">
+            <a:spAutoFit/>
+          </a:bodyPr>
+          <a:lstStyle/>
+          <a:p>
+            <a:r>
+              <a:rPr lang="en-US" dirty="0">
+                <a:solidFill>
+                  <a:srgbClr val="0070C0"/>
+                </a:solidFill>
+              </a:rPr>
+              <a:t>3 rad/s</a:t>
+            </a:r>
+          </a:p>
+        </p:txBody>
+      </p:sp>
+      <p:sp>
+        <p:nvSpPr>
+          <p:cNvPr id="23" name="TextBox 22">
+            <a:extLst>
+              <a:ext uri="{FF2B5EF4-FFF2-40B4-BE49-F238E27FC236}">
+                <a16:creationId xmlns:a16="http://schemas.microsoft.com/office/drawing/2014/main" id="{D9248896-86FD-D44B-9E62-D489A24868F0}"/>
+              </a:ext>
+            </a:extLst>
+          </p:cNvPr>
+          <p:cNvSpPr txBox="1"/>
+          <p:nvPr/>
+        </p:nvSpPr>
+        <p:spPr>
+          <a:xfrm>
+            <a:off x="5968051" y="4047635"/>
+            <a:ext cx="502061" cy="369332"/>
+          </a:xfrm>
+          <a:prstGeom prst="rect">
+            <a:avLst/>
+          </a:prstGeom>
+          <a:solidFill>
+            <a:schemeClr val="bg1"/>
+          </a:solidFill>
+        </p:spPr>
+        <p:txBody>
+          <a:bodyPr wrap="none" rtlCol="0">
+            <a:spAutoFit/>
+          </a:bodyPr>
+          <a:lstStyle/>
+          <a:p>
+            <a:r>
+              <a:rPr lang="en-US" dirty="0">
+                <a:solidFill>
+                  <a:srgbClr val="0070C0"/>
+                </a:solidFill>
+              </a:rPr>
+              <a:t>2 ft</a:t>
+            </a:r>
+          </a:p>
+        </p:txBody>
+      </p:sp>
+      <p:sp>
+        <p:nvSpPr>
+          <p:cNvPr id="24" name="TextBox 23">
+            <a:extLst>
+              <a:ext uri="{FF2B5EF4-FFF2-40B4-BE49-F238E27FC236}">
+                <a16:creationId xmlns:a16="http://schemas.microsoft.com/office/drawing/2014/main" id="{726E288F-878F-9E4F-8C4D-920BA1C63680}"/>
+              </a:ext>
+            </a:extLst>
+          </p:cNvPr>
+          <p:cNvSpPr txBox="1"/>
+          <p:nvPr/>
+        </p:nvSpPr>
+        <p:spPr>
+          <a:xfrm>
+            <a:off x="4061733" y="2611503"/>
+            <a:ext cx="502061" cy="369332"/>
+          </a:xfrm>
+          <a:prstGeom prst="rect">
+            <a:avLst/>
+          </a:prstGeom>
+          <a:solidFill>
+            <a:schemeClr val="bg1"/>
+          </a:solidFill>
+        </p:spPr>
+        <p:txBody>
+          <a:bodyPr wrap="none" rtlCol="0">
+            <a:spAutoFit/>
+          </a:bodyPr>
+          <a:lstStyle/>
+          <a:p>
+            <a:r>
+              <a:rPr lang="en-US" dirty="0">
+                <a:solidFill>
+                  <a:srgbClr val="0070C0"/>
+                </a:solidFill>
+              </a:rPr>
+              <a:t>3 ft</a:t>
+            </a:r>
+          </a:p>
+        </p:txBody>
+      </p:sp>
+      <p:sp>
+        <p:nvSpPr>
+          <p:cNvPr id="25" name="TextBox 24">
+            <a:extLst>
+              <a:ext uri="{FF2B5EF4-FFF2-40B4-BE49-F238E27FC236}">
+                <a16:creationId xmlns:a16="http://schemas.microsoft.com/office/drawing/2014/main" id="{83C78A8F-5F2E-1947-8C4B-87A376985C95}"/>
+              </a:ext>
+            </a:extLst>
+          </p:cNvPr>
+          <p:cNvSpPr txBox="1"/>
+          <p:nvPr/>
+        </p:nvSpPr>
+        <p:spPr>
+          <a:xfrm>
+            <a:off x="6621194" y="3285635"/>
+            <a:ext cx="500458" cy="369332"/>
+          </a:xfrm>
+          <a:prstGeom prst="rect">
+            <a:avLst/>
+          </a:prstGeom>
+          <a:noFill/>
+        </p:spPr>
+        <p:txBody>
+          <a:bodyPr wrap="none" rtlCol="0">
+            <a:spAutoFit/>
+          </a:bodyPr>
+          <a:lstStyle/>
+          <a:p>
+            <a:r>
+              <a:rPr lang="en-US" dirty="0">
+                <a:solidFill>
+                  <a:srgbClr val="0070C0"/>
+                </a:solidFill>
+              </a:rPr>
+              <a:t>30</a:t>
+            </a:r>
+            <a:r>
+              <a:rPr lang="en-US" baseline="30000" dirty="0">
+                <a:solidFill>
+                  <a:srgbClr val="0070C0"/>
+                </a:solidFill>
+              </a:rPr>
+              <a:t>o</a:t>
+            </a:r>
+          </a:p>
+        </p:txBody>
+      </p:sp>
+      <p:sp>
+        <p:nvSpPr>
+          <p:cNvPr id="26" name="TextBox 25">
+            <a:extLst>
+              <a:ext uri="{FF2B5EF4-FFF2-40B4-BE49-F238E27FC236}">
+                <a16:creationId xmlns:a16="http://schemas.microsoft.com/office/drawing/2014/main" id="{48B4D276-7B15-1048-A8FE-95D84E6F6000}"/>
+              </a:ext>
+            </a:extLst>
+          </p:cNvPr>
+          <p:cNvSpPr txBox="1"/>
+          <p:nvPr/>
+        </p:nvSpPr>
+        <p:spPr>
+          <a:xfrm>
+            <a:off x="2277794" y="4059303"/>
+            <a:ext cx="1012265" cy="369332"/>
+          </a:xfrm>
+          <a:prstGeom prst="rect">
+            <a:avLst/>
+          </a:prstGeom>
+          <a:noFill/>
+        </p:spPr>
+        <p:txBody>
+          <a:bodyPr wrap="none" rtlCol="0">
+            <a:spAutoFit/>
+          </a:bodyPr>
+          <a:lstStyle/>
+          <a:p>
+            <a:r>
+              <a:rPr lang="en-US" dirty="0">
+                <a:solidFill>
+                  <a:srgbClr val="0070C0"/>
+                </a:solidFill>
+              </a:rPr>
+              <a:t>.2 rad/s</a:t>
+            </a:r>
+            <a:r>
+              <a:rPr lang="en-US" baseline="30000" dirty="0">
+                <a:solidFill>
+                  <a:srgbClr val="0070C0"/>
+                </a:solidFill>
+              </a:rPr>
+              <a:t>2</a:t>
+            </a:r>
+          </a:p>
+        </p:txBody>
+      </p:sp>
+      <p:sp>
+        <p:nvSpPr>
+          <p:cNvPr id="27" name="TextBox 26">
+            <a:extLst>
+              <a:ext uri="{FF2B5EF4-FFF2-40B4-BE49-F238E27FC236}">
+                <a16:creationId xmlns:a16="http://schemas.microsoft.com/office/drawing/2014/main" id="{C6184924-BC41-A149-BECD-FFE89BB53E80}"/>
+              </a:ext>
+            </a:extLst>
+          </p:cNvPr>
+          <p:cNvSpPr txBox="1"/>
+          <p:nvPr/>
+        </p:nvSpPr>
+        <p:spPr>
+          <a:xfrm>
+            <a:off x="4269880" y="3896019"/>
+            <a:ext cx="986617" cy="369332"/>
+          </a:xfrm>
+          <a:prstGeom prst="rect">
+            <a:avLst/>
+          </a:prstGeom>
+          <a:noFill/>
+        </p:spPr>
+        <p:txBody>
+          <a:bodyPr wrap="none" rtlCol="0">
+            <a:spAutoFit/>
+          </a:bodyPr>
+          <a:lstStyle/>
+          <a:p>
+            <a:r>
+              <a:rPr lang="en-US" dirty="0">
+                <a:solidFill>
+                  <a:srgbClr val="0070C0"/>
+                </a:solidFill>
+              </a:rPr>
+              <a:t>-2 rad/s</a:t>
+            </a:r>
+            <a:r>
+              <a:rPr lang="en-US" baseline="30000" dirty="0">
+                <a:solidFill>
+                  <a:srgbClr val="0070C0"/>
+                </a:solidFill>
+              </a:rPr>
+              <a:t>2</a:t>
+            </a:r>
+          </a:p>
+        </p:txBody>
+      </p:sp>
+      <p:sp>
+        <p:nvSpPr>
+          <p:cNvPr id="28" name="TextBox 27">
+            <a:extLst>
+              <a:ext uri="{FF2B5EF4-FFF2-40B4-BE49-F238E27FC236}">
+                <a16:creationId xmlns:a16="http://schemas.microsoft.com/office/drawing/2014/main" id="{C84D3D9F-9ABF-AD4C-BEF1-36802E0C40F9}"/>
+              </a:ext>
+            </a:extLst>
+          </p:cNvPr>
+          <p:cNvSpPr txBox="1"/>
+          <p:nvPr/>
+        </p:nvSpPr>
+        <p:spPr>
+          <a:xfrm>
+            <a:off x="2484458" y="2711221"/>
+            <a:ext cx="317716" cy="369332"/>
+          </a:xfrm>
+          <a:prstGeom prst="rect">
+            <a:avLst/>
+          </a:prstGeom>
+          <a:noFill/>
+        </p:spPr>
+        <p:txBody>
+          <a:bodyPr wrap="none" rtlCol="0">
+            <a:spAutoFit/>
+          </a:bodyPr>
+          <a:lstStyle/>
+          <a:p>
+            <a:r>
+              <a:rPr lang="en-US" dirty="0"/>
+              <a:t>A</a:t>
+            </a:r>
+          </a:p>
+        </p:txBody>
+      </p:sp>
+      <p:sp>
+        <p:nvSpPr>
+          <p:cNvPr id="29" name="TextBox 28">
+            <a:extLst>
+              <a:ext uri="{FF2B5EF4-FFF2-40B4-BE49-F238E27FC236}">
+                <a16:creationId xmlns:a16="http://schemas.microsoft.com/office/drawing/2014/main" id="{FDBF35E6-49DF-8344-8DB9-D80F187C885B}"/>
+              </a:ext>
+            </a:extLst>
+          </p:cNvPr>
+          <p:cNvSpPr txBox="1"/>
+          <p:nvPr/>
+        </p:nvSpPr>
+        <p:spPr>
+          <a:xfrm>
+            <a:off x="5381855" y="2614540"/>
+            <a:ext cx="309700" cy="369332"/>
+          </a:xfrm>
+          <a:prstGeom prst="rect">
+            <a:avLst/>
+          </a:prstGeom>
+          <a:noFill/>
+        </p:spPr>
+        <p:txBody>
+          <a:bodyPr wrap="none" rtlCol="0">
+            <a:spAutoFit/>
+          </a:bodyPr>
+          <a:lstStyle/>
+          <a:p>
+            <a:r>
+              <a:rPr lang="en-US" dirty="0"/>
+              <a:t>B</a:t>
+            </a:r>
+          </a:p>
+        </p:txBody>
+      </p:sp>
+      <p:sp>
+        <p:nvSpPr>
+          <p:cNvPr id="30" name="TextBox 29">
+            <a:extLst>
+              <a:ext uri="{FF2B5EF4-FFF2-40B4-BE49-F238E27FC236}">
+                <a16:creationId xmlns:a16="http://schemas.microsoft.com/office/drawing/2014/main" id="{4E7EEC96-DD93-1740-B62B-74042BF9C579}"/>
+              </a:ext>
+            </a:extLst>
+          </p:cNvPr>
+          <p:cNvSpPr txBox="1"/>
+          <p:nvPr/>
+        </p:nvSpPr>
+        <p:spPr>
+          <a:xfrm>
+            <a:off x="7778364" y="4274041"/>
+            <a:ext cx="308098" cy="369332"/>
+          </a:xfrm>
+          <a:prstGeom prst="rect">
+            <a:avLst/>
+          </a:prstGeom>
+          <a:noFill/>
+        </p:spPr>
+        <p:txBody>
+          <a:bodyPr wrap="none" rtlCol="0">
+            <a:spAutoFit/>
+          </a:bodyPr>
+          <a:lstStyle/>
+          <a:p>
+            <a:r>
+              <a:rPr lang="en-US" dirty="0"/>
+              <a:t>C</a:t>
+            </a:r>
+          </a:p>
+        </p:txBody>
+      </p:sp>
+      <p:cxnSp>
+        <p:nvCxnSpPr>
+          <p:cNvPr id="31" name="Straight Arrow Connector 30">
+            <a:extLst>
+              <a:ext uri="{FF2B5EF4-FFF2-40B4-BE49-F238E27FC236}">
+                <a16:creationId xmlns:a16="http://schemas.microsoft.com/office/drawing/2014/main" id="{CF4E5C1B-7A76-B845-8DE5-6C50D08FAFE4}"/>
+              </a:ext>
+            </a:extLst>
+          </p:cNvPr>
+          <p:cNvCxnSpPr>
+            <a:cxnSpLocks/>
+          </p:cNvCxnSpPr>
+          <p:nvPr/>
+        </p:nvCxnSpPr>
+        <p:spPr>
+          <a:xfrm>
+            <a:off x="2827726" y="3268217"/>
+            <a:ext cx="1234007" cy="0"/>
+          </a:xfrm>
+          <a:prstGeom prst="straightConnector1">
+            <a:avLst/>
+          </a:prstGeom>
+          <a:ln>
+            <a:tailEnd type="arrow"/>
+          </a:ln>
+        </p:spPr>
+        <p:style>
+          <a:lnRef idx="2">
+            <a:schemeClr val="dk1"/>
+          </a:lnRef>
+          <a:fillRef idx="0">
+            <a:schemeClr val="dk1"/>
+          </a:fillRef>
+          <a:effectRef idx="1">
+            <a:schemeClr val="dk1"/>
+          </a:effectRef>
+          <a:fontRef idx="minor">
+            <a:schemeClr val="tx1"/>
+          </a:fontRef>
+        </p:style>
+      </p:cxnSp>
+      <p:sp>
+        <p:nvSpPr>
+          <p:cNvPr id="32" name="TextBox 31">
+            <a:extLst>
+              <a:ext uri="{FF2B5EF4-FFF2-40B4-BE49-F238E27FC236}">
+                <a16:creationId xmlns:a16="http://schemas.microsoft.com/office/drawing/2014/main" id="{A0419D6C-BDBD-8040-8CC3-FE766057A721}"/>
+              </a:ext>
+            </a:extLst>
+          </p:cNvPr>
+          <p:cNvSpPr txBox="1"/>
+          <p:nvPr/>
+        </p:nvSpPr>
+        <p:spPr>
+          <a:xfrm>
+            <a:off x="2686505" y="1494396"/>
+            <a:ext cx="549989" cy="376469"/>
+          </a:xfrm>
+          <a:prstGeom prst="rect">
+            <a:avLst/>
+          </a:prstGeom>
+          <a:noFill/>
+        </p:spPr>
+        <p:txBody>
+          <a:bodyPr wrap="square" rtlCol="0">
+            <a:spAutoFit/>
+          </a:bodyPr>
+          <a:lstStyle/>
+          <a:p>
+            <a:r>
+              <a:rPr lang="en-US" dirty="0"/>
+              <a:t>y</a:t>
+            </a:r>
+          </a:p>
+        </p:txBody>
+      </p:sp>
+      <p:sp>
+        <p:nvSpPr>
+          <p:cNvPr id="33" name="TextBox 32">
+            <a:extLst>
+              <a:ext uri="{FF2B5EF4-FFF2-40B4-BE49-F238E27FC236}">
+                <a16:creationId xmlns:a16="http://schemas.microsoft.com/office/drawing/2014/main" id="{67E22766-295B-3B4A-B917-E74894212D1E}"/>
+              </a:ext>
+            </a:extLst>
+          </p:cNvPr>
+          <p:cNvSpPr txBox="1"/>
+          <p:nvPr/>
+        </p:nvSpPr>
+        <p:spPr>
+          <a:xfrm>
+            <a:off x="4081874" y="3084243"/>
+            <a:ext cx="540831" cy="376469"/>
+          </a:xfrm>
+          <a:prstGeom prst="rect">
+            <a:avLst/>
+          </a:prstGeom>
+          <a:noFill/>
+        </p:spPr>
+        <p:txBody>
+          <a:bodyPr wrap="square" rtlCol="0">
+            <a:spAutoFit/>
+          </a:bodyPr>
+          <a:lstStyle/>
+          <a:p>
+            <a:r>
+              <a:rPr lang="en-US" dirty="0"/>
+              <a:t>x</a:t>
+            </a:r>
+          </a:p>
+        </p:txBody>
+      </p:sp>
+      <p:cxnSp>
+        <p:nvCxnSpPr>
+          <p:cNvPr id="34" name="Straight Arrow Connector 33">
+            <a:extLst>
+              <a:ext uri="{FF2B5EF4-FFF2-40B4-BE49-F238E27FC236}">
+                <a16:creationId xmlns:a16="http://schemas.microsoft.com/office/drawing/2014/main" id="{8F9D6384-029C-D647-A689-E51E0EEEDA87}"/>
+              </a:ext>
+            </a:extLst>
+          </p:cNvPr>
+          <p:cNvCxnSpPr>
+            <a:cxnSpLocks/>
+          </p:cNvCxnSpPr>
+          <p:nvPr/>
+        </p:nvCxnSpPr>
+        <p:spPr>
+          <a:xfrm flipV="1">
+            <a:off x="2827726" y="1875935"/>
+            <a:ext cx="0" cy="1402769"/>
+          </a:xfrm>
+          <a:prstGeom prst="straightConnector1">
+            <a:avLst/>
+          </a:prstGeom>
+          <a:ln>
+            <a:tailEnd type="arrow"/>
+          </a:ln>
+        </p:spPr>
+        <p:style>
+          <a:lnRef idx="2">
+            <a:schemeClr val="dk1"/>
+          </a:lnRef>
+          <a:fillRef idx="0">
+            <a:schemeClr val="dk1"/>
+          </a:fillRef>
+          <a:effectRef idx="1">
+            <a:schemeClr val="dk1"/>
+          </a:effectRef>
+          <a:fontRef idx="minor">
+            <a:schemeClr val="tx1"/>
+          </a:fontRef>
+        </p:style>
+      </p:cxnSp>
+    </p:spTree>
+    <p:extLst>
+      <p:ext uri="{BB962C8B-B14F-4D97-AF65-F5344CB8AC3E}">
+        <p14:creationId xmlns:p14="http://schemas.microsoft.com/office/powerpoint/2010/main" val="4197921616"/>
+      </p:ext>
+    </p:extLst>
+  </p:cSld>
+  <p:clrMapOvr>
+    <a:masterClrMapping/>
+  </p:clrMapOvr>
+</p:sld>
+</file>
+
+<file path=ppt/slides/slide19.xml><?xml version="1.0" encoding="utf-8"?>
+<p:sld xmlns:a="http://schemas.openxmlformats.org/drawingml/2006/main" xmlns:r="http://schemas.openxmlformats.org/officeDocument/2006/relationships" xmlns:p="http://schemas.openxmlformats.org/presentationml/2006/main">
+  <p:cSld>
+    <p:spTree>
+      <p:nvGrpSpPr>
+        <p:cNvPr id="1" name=""/>
+        <p:cNvGrpSpPr/>
+        <p:nvPr/>
+      </p:nvGrpSpPr>
+      <p:grpSpPr>
+        <a:xfrm>
+          <a:off x="0" y="0"/>
+          <a:ext cx="0" cy="0"/>
+          <a:chOff x="0" y="0"/>
+          <a:chExt cx="0" cy="0"/>
+        </a:xfrm>
+      </p:grpSpPr>
+      <p:sp>
+        <p:nvSpPr>
           <p:cNvPr id="2" name="Title 1">
             <a:extLst>
               <a:ext uri="{FF2B5EF4-FFF2-40B4-BE49-F238E27FC236}">
@@ -18255,146 +19566,6 @@
 </p:sld>
 </file>
 
-<file path=ppt/slides/slide19.xml><?xml version="1.0" encoding="utf-8"?>
-<p:sld xmlns:a="http://schemas.openxmlformats.org/drawingml/2006/main" xmlns:r="http://schemas.openxmlformats.org/officeDocument/2006/relationships" xmlns:p="http://schemas.openxmlformats.org/presentationml/2006/main">
-  <p:cSld>
-    <p:spTree>
-      <p:nvGrpSpPr>
-        <p:cNvPr id="1" name=""/>
-        <p:cNvGrpSpPr/>
-        <p:nvPr/>
-      </p:nvGrpSpPr>
-      <p:grpSpPr>
-        <a:xfrm>
-          <a:off x="0" y="0"/>
-          <a:ext cx="0" cy="0"/>
-          <a:chOff x="0" y="0"/>
-          <a:chExt cx="0" cy="0"/>
-        </a:xfrm>
-      </p:grpSpPr>
-      <p:sp>
-        <p:nvSpPr>
-          <p:cNvPr id="2" name="Title 1">
-            <a:extLst>
-              <a:ext uri="{FF2B5EF4-FFF2-40B4-BE49-F238E27FC236}">
-                <a16:creationId xmlns:a16="http://schemas.microsoft.com/office/drawing/2014/main" id="{FC03F467-CCC2-41C4-8296-A47CFD7A73A8}"/>
-              </a:ext>
-            </a:extLst>
-          </p:cNvPr>
-          <p:cNvSpPr>
-            <a:spLocks noGrp="1"/>
-          </p:cNvSpPr>
-          <p:nvPr>
-            <p:ph type="title"/>
-          </p:nvPr>
-        </p:nvSpPr>
-        <p:spPr/>
-        <p:txBody>
-          <a:bodyPr/>
-          <a:lstStyle/>
-          <a:p>
-            <a:r>
-              <a:rPr lang="en-US" dirty="0"/>
-              <a:t>Worked Example</a:t>
-            </a:r>
-          </a:p>
-        </p:txBody>
-      </p:sp>
-      <p:sp>
-        <p:nvSpPr>
-          <p:cNvPr id="3" name="Content Placeholder 2">
-            <a:extLst>
-              <a:ext uri="{FF2B5EF4-FFF2-40B4-BE49-F238E27FC236}">
-                <a16:creationId xmlns:a16="http://schemas.microsoft.com/office/drawing/2014/main" id="{ED4666B0-B8E1-401E-8E5A-83D0399DF170}"/>
-              </a:ext>
-            </a:extLst>
-          </p:cNvPr>
-          <p:cNvSpPr>
-            <a:spLocks noGrp="1"/>
-          </p:cNvSpPr>
-          <p:nvPr>
-            <p:ph idx="1"/>
-          </p:nvPr>
-        </p:nvSpPr>
-        <p:spPr>
-          <a:xfrm>
-            <a:off x="457200" y="1600201"/>
-            <a:ext cx="8077200" cy="1219199"/>
-          </a:xfrm>
-        </p:spPr>
-        <p:txBody>
-          <a:bodyPr>
-            <a:normAutofit fontScale="85000" lnSpcReduction="10000"/>
-          </a:bodyPr>
-          <a:lstStyle/>
-          <a:p>
-            <a:r>
-              <a:rPr lang="en-US" dirty="0"/>
-              <a:t>A ladder is propped up against a wall as shown below. If the base of the ladder is sliding out at a speed of 2 m/s, what is the speed of the top of the ladder?</a:t>
-            </a:r>
-          </a:p>
-        </p:txBody>
-      </p:sp>
-      <p:pic>
-        <p:nvPicPr>
-          <p:cNvPr id="1026" name="Picture 2" descr="Problem 3 Diagram">
-            <a:extLst>
-              <a:ext uri="{FF2B5EF4-FFF2-40B4-BE49-F238E27FC236}">
-                <a16:creationId xmlns:a16="http://schemas.microsoft.com/office/drawing/2014/main" id="{9ADCE3F2-3378-4F52-9411-66A6A35A85D2}"/>
-              </a:ext>
-            </a:extLst>
-          </p:cNvPr>
-          <p:cNvPicPr>
-            <a:picLocks noChangeAspect="1" noChangeArrowheads="1"/>
-          </p:cNvPicPr>
-          <p:nvPr/>
-        </p:nvPicPr>
-        <p:blipFill>
-          <a:blip r:embed="rId2">
-            <a:extLst>
-              <a:ext uri="{28A0092B-C50C-407E-A947-70E740481C1C}">
-                <a14:useLocalDpi xmlns:a14="http://schemas.microsoft.com/office/drawing/2010/main" val="0"/>
-              </a:ext>
-            </a:extLst>
-          </a:blip>
-          <a:srcRect/>
-          <a:stretch>
-            <a:fillRect/>
-          </a:stretch>
-        </p:blipFill>
-        <p:spPr bwMode="auto">
-          <a:xfrm>
-            <a:off x="2667000" y="3200400"/>
-            <a:ext cx="3810000" cy="3552825"/>
-          </a:xfrm>
-          <a:prstGeom prst="rect">
-            <a:avLst/>
-          </a:prstGeom>
-          <a:noFill/>
-          <a:extLst>
-            <a:ext uri="{909E8E84-426E-40DD-AFC4-6F175D3DCCD1}">
-              <a14:hiddenFill xmlns:a14="http://schemas.microsoft.com/office/drawing/2010/main">
-                <a:solidFill>
-                  <a:srgbClr val="FFFFFF"/>
-                </a:solidFill>
-              </a14:hiddenFill>
-            </a:ext>
-          </a:extLst>
-        </p:spPr>
-      </p:pic>
-    </p:spTree>
-    <p:extLst>
-      <p:ext uri="{BB962C8B-B14F-4D97-AF65-F5344CB8AC3E}">
-        <p14:creationId xmlns:p14="http://schemas.microsoft.com/office/powerpoint/2010/main" val="2180664368"/>
-      </p:ext>
-    </p:extLst>
-  </p:cSld>
-  <p:clrMapOvr>
-    <a:masterClrMapping/>
-  </p:clrMapOvr>
-</p:sld>
-</file>
-
 <file path=ppt/slides/slide2.xml><?xml version="1.0" encoding="utf-8"?>
 <p:sld xmlns:a="http://schemas.openxmlformats.org/drawingml/2006/main" xmlns:r="http://schemas.openxmlformats.org/officeDocument/2006/relationships" xmlns:p="http://schemas.openxmlformats.org/presentationml/2006/main">
   <p:cSld>
@@ -18675,6 +19846,146 @@
 </file>
 
 <file path=ppt/slides/slide20.xml><?xml version="1.0" encoding="utf-8"?>
+<p:sld xmlns:a="http://schemas.openxmlformats.org/drawingml/2006/main" xmlns:r="http://schemas.openxmlformats.org/officeDocument/2006/relationships" xmlns:p="http://schemas.openxmlformats.org/presentationml/2006/main">
+  <p:cSld>
+    <p:spTree>
+      <p:nvGrpSpPr>
+        <p:cNvPr id="1" name=""/>
+        <p:cNvGrpSpPr/>
+        <p:nvPr/>
+      </p:nvGrpSpPr>
+      <p:grpSpPr>
+        <a:xfrm>
+          <a:off x="0" y="0"/>
+          <a:ext cx="0" cy="0"/>
+          <a:chOff x="0" y="0"/>
+          <a:chExt cx="0" cy="0"/>
+        </a:xfrm>
+      </p:grpSpPr>
+      <p:sp>
+        <p:nvSpPr>
+          <p:cNvPr id="2" name="Title 1">
+            <a:extLst>
+              <a:ext uri="{FF2B5EF4-FFF2-40B4-BE49-F238E27FC236}">
+                <a16:creationId xmlns:a16="http://schemas.microsoft.com/office/drawing/2014/main" id="{FC03F467-CCC2-41C4-8296-A47CFD7A73A8}"/>
+              </a:ext>
+            </a:extLst>
+          </p:cNvPr>
+          <p:cNvSpPr>
+            <a:spLocks noGrp="1"/>
+          </p:cNvSpPr>
+          <p:nvPr>
+            <p:ph type="title"/>
+          </p:nvPr>
+        </p:nvSpPr>
+        <p:spPr/>
+        <p:txBody>
+          <a:bodyPr/>
+          <a:lstStyle/>
+          <a:p>
+            <a:r>
+              <a:rPr lang="en-US" dirty="0"/>
+              <a:t>Worked Example</a:t>
+            </a:r>
+          </a:p>
+        </p:txBody>
+      </p:sp>
+      <p:sp>
+        <p:nvSpPr>
+          <p:cNvPr id="3" name="Content Placeholder 2">
+            <a:extLst>
+              <a:ext uri="{FF2B5EF4-FFF2-40B4-BE49-F238E27FC236}">
+                <a16:creationId xmlns:a16="http://schemas.microsoft.com/office/drawing/2014/main" id="{ED4666B0-B8E1-401E-8E5A-83D0399DF170}"/>
+              </a:ext>
+            </a:extLst>
+          </p:cNvPr>
+          <p:cNvSpPr>
+            <a:spLocks noGrp="1"/>
+          </p:cNvSpPr>
+          <p:nvPr>
+            <p:ph idx="1"/>
+          </p:nvPr>
+        </p:nvSpPr>
+        <p:spPr>
+          <a:xfrm>
+            <a:off x="457200" y="1600201"/>
+            <a:ext cx="8077200" cy="1219199"/>
+          </a:xfrm>
+        </p:spPr>
+        <p:txBody>
+          <a:bodyPr>
+            <a:normAutofit fontScale="85000" lnSpcReduction="10000"/>
+          </a:bodyPr>
+          <a:lstStyle/>
+          <a:p>
+            <a:r>
+              <a:rPr lang="en-US" dirty="0"/>
+              <a:t>A ladder is propped up against a wall as shown below. If the base of the ladder is sliding out at a speed of 2 m/s, what is the speed of the top of the ladder?</a:t>
+            </a:r>
+          </a:p>
+        </p:txBody>
+      </p:sp>
+      <p:pic>
+        <p:nvPicPr>
+          <p:cNvPr id="1026" name="Picture 2" descr="Problem 3 Diagram">
+            <a:extLst>
+              <a:ext uri="{FF2B5EF4-FFF2-40B4-BE49-F238E27FC236}">
+                <a16:creationId xmlns:a16="http://schemas.microsoft.com/office/drawing/2014/main" id="{9ADCE3F2-3378-4F52-9411-66A6A35A85D2}"/>
+              </a:ext>
+            </a:extLst>
+          </p:cNvPr>
+          <p:cNvPicPr>
+            <a:picLocks noChangeAspect="1" noChangeArrowheads="1"/>
+          </p:cNvPicPr>
+          <p:nvPr/>
+        </p:nvPicPr>
+        <p:blipFill>
+          <a:blip r:embed="rId2">
+            <a:extLst>
+              <a:ext uri="{28A0092B-C50C-407E-A947-70E740481C1C}">
+                <a14:useLocalDpi xmlns:a14="http://schemas.microsoft.com/office/drawing/2010/main" val="0"/>
+              </a:ext>
+            </a:extLst>
+          </a:blip>
+          <a:srcRect/>
+          <a:stretch>
+            <a:fillRect/>
+          </a:stretch>
+        </p:blipFill>
+        <p:spPr bwMode="auto">
+          <a:xfrm>
+            <a:off x="2667000" y="3200400"/>
+            <a:ext cx="3810000" cy="3552825"/>
+          </a:xfrm>
+          <a:prstGeom prst="rect">
+            <a:avLst/>
+          </a:prstGeom>
+          <a:noFill/>
+          <a:extLst>
+            <a:ext uri="{909E8E84-426E-40DD-AFC4-6F175D3DCCD1}">
+              <a14:hiddenFill xmlns:a14="http://schemas.microsoft.com/office/drawing/2010/main">
+                <a:solidFill>
+                  <a:srgbClr val="FFFFFF"/>
+                </a:solidFill>
+              </a14:hiddenFill>
+            </a:ext>
+          </a:extLst>
+        </p:spPr>
+      </p:pic>
+    </p:spTree>
+    <p:extLst>
+      <p:ext uri="{BB962C8B-B14F-4D97-AF65-F5344CB8AC3E}">
+        <p14:creationId xmlns:p14="http://schemas.microsoft.com/office/powerpoint/2010/main" val="2180664368"/>
+      </p:ext>
+    </p:extLst>
+  </p:cSld>
+  <p:clrMapOvr>
+    <a:masterClrMapping/>
+  </p:clrMapOvr>
+</p:sld>
+</file>
+
+<file path=ppt/slides/slide21.xml><?xml version="1.0" encoding="utf-8"?>
 <p:sld xmlns:a="http://schemas.openxmlformats.org/drawingml/2006/main" xmlns:r="http://schemas.openxmlformats.org/officeDocument/2006/relationships" xmlns:p="http://schemas.openxmlformats.org/presentationml/2006/main">
   <p:cSld>
     <p:spTree>
@@ -19536,8 +20847,8 @@
           </a:p>
         </p:txBody>
       </p:sp>
-      <mc:AlternateContent xmlns:mc="http://schemas.openxmlformats.org/markup-compatibility/2006">
-        <mc:Choice xmlns:a14="http://schemas.microsoft.com/office/drawing/2010/main" Requires="a14">
+      <mc:AlternateContent xmlns:mc="http://schemas.openxmlformats.org/markup-compatibility/2006" xmlns:a14="http://schemas.microsoft.com/office/drawing/2010/main">
+        <mc:Choice Requires="a14">
           <p:sp>
             <p:nvSpPr>
               <p:cNvPr id="3" name="Content Placeholder 2"/>
@@ -20477,7 +21788,7 @@
             </p:txBody>
           </p:sp>
         </mc:Choice>
-        <mc:Fallback>
+        <mc:Fallback xmlns="">
           <p:sp>
             <p:nvSpPr>
               <p:cNvPr id="3" name="Content Placeholder 2"/>
@@ -21100,8 +22411,8 @@
           </a:p>
         </p:txBody>
       </p:sp>
-      <mc:AlternateContent xmlns:mc="http://schemas.openxmlformats.org/markup-compatibility/2006">
-        <mc:Choice xmlns:a14="http://schemas.microsoft.com/office/drawing/2010/main" Requires="a14">
+      <mc:AlternateContent xmlns:mc="http://schemas.openxmlformats.org/markup-compatibility/2006" xmlns:a14="http://schemas.microsoft.com/office/drawing/2010/main">
+        <mc:Choice Requires="a14">
           <p:sp>
             <p:nvSpPr>
               <p:cNvPr id="19" name="TextBox 18">
@@ -21162,7 +22473,7 @@
             </p:txBody>
           </p:sp>
         </mc:Choice>
-        <mc:Fallback>
+        <mc:Fallback xmlns="">
           <p:sp>
             <p:nvSpPr>
               <p:cNvPr id="19" name="TextBox 18">
@@ -21207,8 +22518,8 @@
           </p:sp>
         </mc:Fallback>
       </mc:AlternateContent>
-      <mc:AlternateContent xmlns:mc="http://schemas.openxmlformats.org/markup-compatibility/2006">
-        <mc:Choice xmlns:a14="http://schemas.microsoft.com/office/drawing/2010/main" Requires="a14">
+      <mc:AlternateContent xmlns:mc="http://schemas.openxmlformats.org/markup-compatibility/2006" xmlns:a14="http://schemas.microsoft.com/office/drawing/2010/main">
+        <mc:Choice Requires="a14">
           <p:sp>
             <p:nvSpPr>
               <p:cNvPr id="20" name="TextBox 19">
@@ -21269,7 +22580,7 @@
             </p:txBody>
           </p:sp>
         </mc:Choice>
-        <mc:Fallback>
+        <mc:Fallback xmlns="">
           <p:sp>
             <p:nvSpPr>
               <p:cNvPr id="20" name="TextBox 19">
@@ -21795,8 +23106,8 @@
             </a:fontRef>
           </p:style>
         </p:cxnSp>
-        <mc:AlternateContent xmlns:mc="http://schemas.openxmlformats.org/markup-compatibility/2006">
-          <mc:Choice xmlns:a14="http://schemas.microsoft.com/office/drawing/2010/main" Requires="a14">
+        <mc:AlternateContent xmlns:mc="http://schemas.openxmlformats.org/markup-compatibility/2006" xmlns:a14="http://schemas.microsoft.com/office/drawing/2010/main">
+          <mc:Choice Requires="a14">
             <p:sp>
               <p:nvSpPr>
                 <p:cNvPr id="58" name="TextBox 57">
@@ -21825,6 +23136,7 @@
                 </a:bodyPr>
                 <a:lstStyle/>
                 <a:p>
+                  <a:pPr/>
                   <a14:m>
                     <m:oMathPara xmlns:m="http://schemas.openxmlformats.org/officeDocument/2006/math">
                       <m:oMathParaPr>
@@ -21864,7 +23176,7 @@
               </p:txBody>
             </p:sp>
           </mc:Choice>
-          <mc:Fallback>
+          <mc:Fallback xmlns="">
             <p:sp>
               <p:nvSpPr>
                 <p:cNvPr id="58" name="TextBox 57">
@@ -21909,8 +23221,8 @@
             </p:sp>
           </mc:Fallback>
         </mc:AlternateContent>
-        <mc:AlternateContent xmlns:mc="http://schemas.openxmlformats.org/markup-compatibility/2006">
-          <mc:Choice xmlns:a14="http://schemas.microsoft.com/office/drawing/2010/main" Requires="a14">
+        <mc:AlternateContent xmlns:mc="http://schemas.openxmlformats.org/markup-compatibility/2006" xmlns:a14="http://schemas.microsoft.com/office/drawing/2010/main">
+          <mc:Choice Requires="a14">
             <p:sp>
               <p:nvSpPr>
                 <p:cNvPr id="59" name="TextBox 58">
@@ -21939,6 +23251,7 @@
                 </a:bodyPr>
                 <a:lstStyle/>
                 <a:p>
+                  <a:pPr/>
                   <a14:m>
                     <m:oMathPara xmlns:m="http://schemas.openxmlformats.org/officeDocument/2006/math">
                       <m:oMathParaPr>
@@ -21978,7 +23291,7 @@
               </p:txBody>
             </p:sp>
           </mc:Choice>
-          <mc:Fallback>
+          <mc:Fallback xmlns="">
             <p:sp>
               <p:nvSpPr>
                 <p:cNvPr id="59" name="TextBox 58">
@@ -22126,8 +23439,8 @@
             </a:fontRef>
           </p:style>
         </p:cxnSp>
-        <mc:AlternateContent xmlns:mc="http://schemas.openxmlformats.org/markup-compatibility/2006">
-          <mc:Choice xmlns:a14="http://schemas.microsoft.com/office/drawing/2010/main" Requires="a14">
+        <mc:AlternateContent xmlns:mc="http://schemas.openxmlformats.org/markup-compatibility/2006" xmlns:a14="http://schemas.microsoft.com/office/drawing/2010/main">
+          <mc:Choice Requires="a14">
             <p:sp>
               <p:nvSpPr>
                 <p:cNvPr id="64" name="TextBox 63">
@@ -22156,6 +23469,7 @@
                 </a:bodyPr>
                 <a:lstStyle/>
                 <a:p>
+                  <a:pPr/>
                   <a14:m>
                     <m:oMathPara xmlns:m="http://schemas.openxmlformats.org/officeDocument/2006/math">
                       <m:oMathParaPr>
@@ -22176,7 +23490,7 @@
               </p:txBody>
             </p:sp>
           </mc:Choice>
-          <mc:Fallback>
+          <mc:Fallback xmlns="">
             <p:sp>
               <p:nvSpPr>
                 <p:cNvPr id="64" name="TextBox 63">
@@ -22221,8 +23535,8 @@
             </p:sp>
           </mc:Fallback>
         </mc:AlternateContent>
-        <mc:AlternateContent xmlns:mc="http://schemas.openxmlformats.org/markup-compatibility/2006">
-          <mc:Choice xmlns:a14="http://schemas.microsoft.com/office/drawing/2010/main" Requires="a14">
+        <mc:AlternateContent xmlns:mc="http://schemas.openxmlformats.org/markup-compatibility/2006" xmlns:a14="http://schemas.microsoft.com/office/drawing/2010/main">
+          <mc:Choice Requires="a14">
             <p:sp>
               <p:nvSpPr>
                 <p:cNvPr id="65" name="TextBox 64">
@@ -22251,6 +23565,7 @@
                 </a:bodyPr>
                 <a:lstStyle/>
                 <a:p>
+                  <a:pPr/>
                   <a14:m>
                     <m:oMathPara xmlns:m="http://schemas.openxmlformats.org/officeDocument/2006/math">
                       <m:oMathParaPr>
@@ -22271,7 +23586,7 @@
               </p:txBody>
             </p:sp>
           </mc:Choice>
-          <mc:Fallback>
+          <mc:Fallback xmlns="">
             <p:sp>
               <p:nvSpPr>
                 <p:cNvPr id="65" name="TextBox 64">
@@ -22454,8 +23769,8 @@
             </a:fontRef>
           </p:style>
         </p:cxnSp>
-        <mc:AlternateContent xmlns:mc="http://schemas.openxmlformats.org/markup-compatibility/2006">
-          <mc:Choice xmlns:a14="http://schemas.microsoft.com/office/drawing/2010/main" Requires="a14">
+        <mc:AlternateContent xmlns:mc="http://schemas.openxmlformats.org/markup-compatibility/2006" xmlns:a14="http://schemas.microsoft.com/office/drawing/2010/main">
+          <mc:Choice Requires="a14">
             <p:sp>
               <p:nvSpPr>
                 <p:cNvPr id="70" name="TextBox 69">
@@ -22484,6 +23799,7 @@
                 </a:bodyPr>
                 <a:lstStyle/>
                 <a:p>
+                  <a:pPr/>
                   <a14:m>
                     <m:oMathPara xmlns:m="http://schemas.openxmlformats.org/officeDocument/2006/math">
                       <m:oMathParaPr>
@@ -22523,7 +23839,7 @@
               </p:txBody>
             </p:sp>
           </mc:Choice>
-          <mc:Fallback>
+          <mc:Fallback xmlns="">
             <p:sp>
               <p:nvSpPr>
                 <p:cNvPr id="70" name="TextBox 69">
@@ -22568,8 +23884,8 @@
             </p:sp>
           </mc:Fallback>
         </mc:AlternateContent>
-        <mc:AlternateContent xmlns:mc="http://schemas.openxmlformats.org/markup-compatibility/2006">
-          <mc:Choice xmlns:a14="http://schemas.microsoft.com/office/drawing/2010/main" Requires="a14">
+        <mc:AlternateContent xmlns:mc="http://schemas.openxmlformats.org/markup-compatibility/2006" xmlns:a14="http://schemas.microsoft.com/office/drawing/2010/main">
+          <mc:Choice Requires="a14">
             <p:sp>
               <p:nvSpPr>
                 <p:cNvPr id="71" name="TextBox 70">
@@ -22598,6 +23914,7 @@
                 </a:bodyPr>
                 <a:lstStyle/>
                 <a:p>
+                  <a:pPr/>
                   <a14:m>
                     <m:oMathPara xmlns:m="http://schemas.openxmlformats.org/officeDocument/2006/math">
                       <m:oMathParaPr>
@@ -22637,7 +23954,7 @@
               </p:txBody>
             </p:sp>
           </mc:Choice>
-          <mc:Fallback>
+          <mc:Fallback xmlns="">
             <p:sp>
               <p:nvSpPr>
                 <p:cNvPr id="71" name="TextBox 70">
@@ -22743,8 +24060,8 @@
           </a:p>
         </p:txBody>
       </p:sp>
-      <mc:AlternateContent xmlns:mc="http://schemas.openxmlformats.org/markup-compatibility/2006">
-        <mc:Choice xmlns:a14="http://schemas.microsoft.com/office/drawing/2010/main" Requires="a14">
+      <mc:AlternateContent xmlns:mc="http://schemas.openxmlformats.org/markup-compatibility/2006" xmlns:a14="http://schemas.microsoft.com/office/drawing/2010/main">
+        <mc:Choice Requires="a14">
           <p:sp>
             <p:nvSpPr>
               <p:cNvPr id="3" name="Content Placeholder 2">
@@ -23711,7 +25028,7 @@
             </p:txBody>
           </p:sp>
         </mc:Choice>
-        <mc:Fallback>
+        <mc:Fallback xmlns="">
           <p:sp>
             <p:nvSpPr>
               <p:cNvPr id="3" name="Content Placeholder 2">
@@ -23886,8 +25203,8 @@
             </a:fontRef>
           </p:style>
         </p:cxnSp>
-        <mc:AlternateContent xmlns:mc="http://schemas.openxmlformats.org/markup-compatibility/2006">
-          <mc:Choice xmlns:a14="http://schemas.microsoft.com/office/drawing/2010/main" Requires="a14">
+        <mc:AlternateContent xmlns:mc="http://schemas.openxmlformats.org/markup-compatibility/2006" xmlns:a14="http://schemas.microsoft.com/office/drawing/2010/main">
+          <mc:Choice Requires="a14">
             <p:sp>
               <p:nvSpPr>
                 <p:cNvPr id="39" name="TextBox 38">
@@ -23916,6 +25233,7 @@
                 </a:bodyPr>
                 <a:lstStyle/>
                 <a:p>
+                  <a:pPr/>
                   <a14:m>
                     <m:oMathPara xmlns:m="http://schemas.openxmlformats.org/officeDocument/2006/math">
                       <m:oMathParaPr>
@@ -23936,7 +25254,7 @@
               </p:txBody>
             </p:sp>
           </mc:Choice>
-          <mc:Fallback>
+          <mc:Fallback xmlns="">
             <p:sp>
               <p:nvSpPr>
                 <p:cNvPr id="39" name="TextBox 38">
@@ -23981,8 +25299,8 @@
             </p:sp>
           </mc:Fallback>
         </mc:AlternateContent>
-        <mc:AlternateContent xmlns:mc="http://schemas.openxmlformats.org/markup-compatibility/2006">
-          <mc:Choice xmlns:a14="http://schemas.microsoft.com/office/drawing/2010/main" Requires="a14">
+        <mc:AlternateContent xmlns:mc="http://schemas.openxmlformats.org/markup-compatibility/2006" xmlns:a14="http://schemas.microsoft.com/office/drawing/2010/main">
+          <mc:Choice Requires="a14">
             <p:sp>
               <p:nvSpPr>
                 <p:cNvPr id="40" name="TextBox 39">
@@ -24011,6 +25329,7 @@
                 </a:bodyPr>
                 <a:lstStyle/>
                 <a:p>
+                  <a:pPr/>
                   <a14:m>
                     <m:oMathPara xmlns:m="http://schemas.openxmlformats.org/officeDocument/2006/math">
                       <m:oMathParaPr>
@@ -24031,7 +25350,7 @@
               </p:txBody>
             </p:sp>
           </mc:Choice>
-          <mc:Fallback>
+          <mc:Fallback xmlns="">
             <p:sp>
               <p:nvSpPr>
                 <p:cNvPr id="40" name="TextBox 39">
@@ -24914,8 +26233,8 @@
           </a:fontRef>
         </p:style>
       </p:cxnSp>
-      <mc:AlternateContent xmlns:mc="http://schemas.openxmlformats.org/markup-compatibility/2006">
-        <mc:Choice xmlns:a14="http://schemas.microsoft.com/office/drawing/2010/main" Requires="a14">
+      <mc:AlternateContent xmlns:mc="http://schemas.openxmlformats.org/markup-compatibility/2006" xmlns:a14="http://schemas.microsoft.com/office/drawing/2010/main">
+        <mc:Choice Requires="a14">
           <p:sp>
             <p:nvSpPr>
               <p:cNvPr id="66" name="TextBox 65">
@@ -24944,6 +26263,7 @@
               </a:bodyPr>
               <a:lstStyle/>
               <a:p>
+                <a:pPr/>
                 <a14:m>
                   <m:oMathPara xmlns:m="http://schemas.openxmlformats.org/officeDocument/2006/math">
                     <m:oMathParaPr>
@@ -24998,7 +26318,7 @@
             </p:txBody>
           </p:sp>
         </mc:Choice>
-        <mc:Fallback>
+        <mc:Fallback xmlns="">
           <p:sp>
             <p:nvSpPr>
               <p:cNvPr id="66" name="TextBox 65">
@@ -25043,8 +26363,8 @@
           </p:sp>
         </mc:Fallback>
       </mc:AlternateContent>
-      <mc:AlternateContent xmlns:mc="http://schemas.openxmlformats.org/markup-compatibility/2006">
-        <mc:Choice xmlns:a14="http://schemas.microsoft.com/office/drawing/2010/main" Requires="a14">
+      <mc:AlternateContent xmlns:mc="http://schemas.openxmlformats.org/markup-compatibility/2006" xmlns:a14="http://schemas.microsoft.com/office/drawing/2010/main">
+        <mc:Choice Requires="a14">
           <p:sp>
             <p:nvSpPr>
               <p:cNvPr id="67" name="TextBox 66">
@@ -25073,6 +26393,7 @@
               </a:bodyPr>
               <a:lstStyle/>
               <a:p>
+                <a:pPr/>
                 <a14:m>
                   <m:oMathPara xmlns:m="http://schemas.openxmlformats.org/officeDocument/2006/math">
                     <m:oMathParaPr>
@@ -25127,7 +26448,7 @@
             </p:txBody>
           </p:sp>
         </mc:Choice>
-        <mc:Fallback>
+        <mc:Fallback xmlns="">
           <p:sp>
             <p:nvSpPr>
               <p:cNvPr id="67" name="TextBox 66">
@@ -25313,8 +26634,8 @@
           </a:p>
         </p:txBody>
       </p:sp>
-      <mc:AlternateContent xmlns:mc="http://schemas.openxmlformats.org/markup-compatibility/2006">
-        <mc:Choice xmlns:a14="http://schemas.microsoft.com/office/drawing/2010/main" Requires="a14">
+      <mc:AlternateContent xmlns:mc="http://schemas.openxmlformats.org/markup-compatibility/2006" xmlns:a14="http://schemas.microsoft.com/office/drawing/2010/main">
+        <mc:Choice Requires="a14">
           <p:sp>
             <p:nvSpPr>
               <p:cNvPr id="73" name="TextBox 72">
@@ -25523,7 +26844,7 @@
             </p:txBody>
           </p:sp>
         </mc:Choice>
-        <mc:Fallback>
+        <mc:Fallback xmlns="">
           <p:sp>
             <p:nvSpPr>
               <p:cNvPr id="73" name="TextBox 72">
@@ -25995,8 +27316,8 @@
               </a:fontRef>
             </p:style>
           </p:cxnSp>
-          <mc:AlternateContent xmlns:mc="http://schemas.openxmlformats.org/markup-compatibility/2006">
-            <mc:Choice xmlns:a14="http://schemas.microsoft.com/office/drawing/2010/main" Requires="a14">
+          <mc:AlternateContent xmlns:mc="http://schemas.openxmlformats.org/markup-compatibility/2006" xmlns:a14="http://schemas.microsoft.com/office/drawing/2010/main">
+            <mc:Choice Requires="a14">
               <p:sp>
                 <p:nvSpPr>
                   <p:cNvPr id="72" name="TextBox 71">
@@ -26028,6 +27349,7 @@
                   </a:bodyPr>
                   <a:lstStyle/>
                   <a:p>
+                    <a:pPr/>
                     <a14:m>
                       <m:oMathPara xmlns:m="http://schemas.openxmlformats.org/officeDocument/2006/math">
                         <m:oMathParaPr>
@@ -26088,7 +27410,7 @@
                 </p:txBody>
               </p:sp>
             </mc:Choice>
-            <mc:Fallback>
+            <mc:Fallback xmlns="">
               <p:sp>
                 <p:nvSpPr>
                   <p:cNvPr id="72" name="TextBox 71">
@@ -26136,8 +27458,8 @@
               </p:sp>
             </mc:Fallback>
           </mc:AlternateContent>
-          <mc:AlternateContent xmlns:mc="http://schemas.openxmlformats.org/markup-compatibility/2006">
-            <mc:Choice xmlns:a14="http://schemas.microsoft.com/office/drawing/2010/main" Requires="a14">
+          <mc:AlternateContent xmlns:mc="http://schemas.openxmlformats.org/markup-compatibility/2006" xmlns:a14="http://schemas.microsoft.com/office/drawing/2010/main">
+            <mc:Choice Requires="a14">
               <p:sp>
                 <p:nvSpPr>
                   <p:cNvPr id="73" name="TextBox 72">
@@ -26169,6 +27491,7 @@
                   </a:bodyPr>
                   <a:lstStyle/>
                   <a:p>
+                    <a:pPr/>
                     <a14:m>
                       <m:oMathPara xmlns:m="http://schemas.openxmlformats.org/officeDocument/2006/math">
                         <m:oMathParaPr>
@@ -26229,7 +27552,7 @@
                 </p:txBody>
               </p:sp>
             </mc:Choice>
-            <mc:Fallback>
+            <mc:Fallback xmlns="">
               <p:sp>
                 <p:nvSpPr>
                   <p:cNvPr id="73" name="TextBox 72">
@@ -26677,8 +28000,8 @@
               </a:fontRef>
             </p:style>
           </p:cxnSp>
-          <mc:AlternateContent xmlns:mc="http://schemas.openxmlformats.org/markup-compatibility/2006">
-            <mc:Choice xmlns:a14="http://schemas.microsoft.com/office/drawing/2010/main" Requires="a14">
+          <mc:AlternateContent xmlns:mc="http://schemas.openxmlformats.org/markup-compatibility/2006" xmlns:a14="http://schemas.microsoft.com/office/drawing/2010/main">
+            <mc:Choice Requires="a14">
               <p:sp>
                 <p:nvSpPr>
                   <p:cNvPr id="80" name="TextBox 79">
@@ -26710,6 +28033,7 @@
                   </a:bodyPr>
                   <a:lstStyle/>
                   <a:p>
+                    <a:pPr/>
                     <a14:m>
                       <m:oMathPara xmlns:m="http://schemas.openxmlformats.org/officeDocument/2006/math">
                         <m:oMathParaPr>
@@ -26770,7 +28094,7 @@
                 </p:txBody>
               </p:sp>
             </mc:Choice>
-            <mc:Fallback>
+            <mc:Fallback xmlns="">
               <p:sp>
                 <p:nvSpPr>
                   <p:cNvPr id="80" name="TextBox 79">
@@ -26818,8 +28142,8 @@
               </p:sp>
             </mc:Fallback>
           </mc:AlternateContent>
-          <mc:AlternateContent xmlns:mc="http://schemas.openxmlformats.org/markup-compatibility/2006">
-            <mc:Choice xmlns:a14="http://schemas.microsoft.com/office/drawing/2010/main" Requires="a14">
+          <mc:AlternateContent xmlns:mc="http://schemas.openxmlformats.org/markup-compatibility/2006" xmlns:a14="http://schemas.microsoft.com/office/drawing/2010/main">
+            <mc:Choice Requires="a14">
               <p:sp>
                 <p:nvSpPr>
                   <p:cNvPr id="81" name="TextBox 80">
@@ -26851,6 +28175,7 @@
                   </a:bodyPr>
                   <a:lstStyle/>
                   <a:p>
+                    <a:pPr/>
                     <a14:m>
                       <m:oMathPara xmlns:m="http://schemas.openxmlformats.org/officeDocument/2006/math">
                         <m:oMathParaPr>
@@ -26911,7 +28236,7 @@
                 </p:txBody>
               </p:sp>
             </mc:Choice>
-            <mc:Fallback>
+            <mc:Fallback xmlns="">
               <p:sp>
                 <p:nvSpPr>
                   <p:cNvPr id="81" name="TextBox 80">
@@ -27037,8 +28362,8 @@
           </a:p>
         </p:txBody>
       </p:sp>
-      <mc:AlternateContent xmlns:mc="http://schemas.openxmlformats.org/markup-compatibility/2006">
-        <mc:Choice xmlns:a14="http://schemas.microsoft.com/office/drawing/2010/main" Requires="a14">
+      <mc:AlternateContent xmlns:mc="http://schemas.openxmlformats.org/markup-compatibility/2006" xmlns:a14="http://schemas.microsoft.com/office/drawing/2010/main">
+        <mc:Choice Requires="a14">
           <p:sp>
             <p:nvSpPr>
               <p:cNvPr id="3" name="Content Placeholder 2">
@@ -27542,7 +28867,7 @@
             </p:txBody>
           </p:sp>
         </mc:Choice>
-        <mc:Fallback>
+        <mc:Fallback xmlns="">
           <p:sp>
             <p:nvSpPr>
               <p:cNvPr id="3" name="Content Placeholder 2">
@@ -27717,8 +29042,8 @@
             </a:fontRef>
           </p:style>
         </p:cxnSp>
-        <mc:AlternateContent xmlns:mc="http://schemas.openxmlformats.org/markup-compatibility/2006">
-          <mc:Choice xmlns:a14="http://schemas.microsoft.com/office/drawing/2010/main" Requires="a14">
+        <mc:AlternateContent xmlns:mc="http://schemas.openxmlformats.org/markup-compatibility/2006" xmlns:a14="http://schemas.microsoft.com/office/drawing/2010/main">
+          <mc:Choice Requires="a14">
             <p:sp>
               <p:nvSpPr>
                 <p:cNvPr id="39" name="TextBox 38">
@@ -27747,6 +29072,7 @@
                 </a:bodyPr>
                 <a:lstStyle/>
                 <a:p>
+                  <a:pPr/>
                   <a14:m>
                     <m:oMathPara xmlns:m="http://schemas.openxmlformats.org/officeDocument/2006/math">
                       <m:oMathParaPr>
@@ -27767,7 +29093,7 @@
               </p:txBody>
             </p:sp>
           </mc:Choice>
-          <mc:Fallback>
+          <mc:Fallback xmlns="">
             <p:sp>
               <p:nvSpPr>
                 <p:cNvPr id="39" name="TextBox 38">
@@ -27812,8 +29138,8 @@
             </p:sp>
           </mc:Fallback>
         </mc:AlternateContent>
-        <mc:AlternateContent xmlns:mc="http://schemas.openxmlformats.org/markup-compatibility/2006">
-          <mc:Choice xmlns:a14="http://schemas.microsoft.com/office/drawing/2010/main" Requires="a14">
+        <mc:AlternateContent xmlns:mc="http://schemas.openxmlformats.org/markup-compatibility/2006" xmlns:a14="http://schemas.microsoft.com/office/drawing/2010/main">
+          <mc:Choice Requires="a14">
             <p:sp>
               <p:nvSpPr>
                 <p:cNvPr id="40" name="TextBox 39">
@@ -27842,6 +29168,7 @@
                 </a:bodyPr>
                 <a:lstStyle/>
                 <a:p>
+                  <a:pPr/>
                   <a14:m>
                     <m:oMathPara xmlns:m="http://schemas.openxmlformats.org/officeDocument/2006/math">
                       <m:oMathParaPr>
@@ -27862,7 +29189,7 @@
               </p:txBody>
             </p:sp>
           </mc:Choice>
-          <mc:Fallback>
+          <mc:Fallback xmlns="">
             <p:sp>
               <p:nvSpPr>
                 <p:cNvPr id="40" name="TextBox 39">
@@ -28269,8 +29596,8 @@
           </a:fontRef>
         </p:style>
       </p:cxnSp>
-      <mc:AlternateContent xmlns:mc="http://schemas.openxmlformats.org/markup-compatibility/2006">
-        <mc:Choice xmlns:a14="http://schemas.microsoft.com/office/drawing/2010/main" Requires="a14">
+      <mc:AlternateContent xmlns:mc="http://schemas.openxmlformats.org/markup-compatibility/2006" xmlns:a14="http://schemas.microsoft.com/office/drawing/2010/main">
+        <mc:Choice Requires="a14">
           <p:sp>
             <p:nvSpPr>
               <p:cNvPr id="66" name="TextBox 65">
@@ -28299,6 +29626,7 @@
               </a:bodyPr>
               <a:lstStyle/>
               <a:p>
+                <a:pPr/>
                 <a14:m>
                   <m:oMathPara xmlns:m="http://schemas.openxmlformats.org/officeDocument/2006/math">
                     <m:oMathParaPr>
@@ -28368,7 +29696,7 @@
             </p:txBody>
           </p:sp>
         </mc:Choice>
-        <mc:Fallback>
+        <mc:Fallback xmlns="">
           <p:sp>
             <p:nvSpPr>
               <p:cNvPr id="66" name="TextBox 65">
@@ -28656,8 +29984,8 @@
             </a:fontRef>
           </p:style>
         </p:cxnSp>
-        <mc:AlternateContent xmlns:mc="http://schemas.openxmlformats.org/markup-compatibility/2006">
-          <mc:Choice xmlns:a14="http://schemas.microsoft.com/office/drawing/2010/main" Requires="a14">
+        <mc:AlternateContent xmlns:mc="http://schemas.openxmlformats.org/markup-compatibility/2006" xmlns:a14="http://schemas.microsoft.com/office/drawing/2010/main">
+          <mc:Choice Requires="a14">
             <p:sp>
               <p:nvSpPr>
                 <p:cNvPr id="34" name="TextBox 33">
@@ -28686,6 +30014,7 @@
                 </a:bodyPr>
                 <a:lstStyle/>
                 <a:p>
+                  <a:pPr/>
                   <a14:m>
                     <m:oMathPara xmlns:m="http://schemas.openxmlformats.org/officeDocument/2006/math">
                       <m:oMathParaPr>
@@ -28725,7 +30054,7 @@
               </p:txBody>
             </p:sp>
           </mc:Choice>
-          <mc:Fallback>
+          <mc:Fallback xmlns="">
             <p:sp>
               <p:nvSpPr>
                 <p:cNvPr id="34" name="TextBox 33">
@@ -28770,8 +30099,8 @@
             </p:sp>
           </mc:Fallback>
         </mc:AlternateContent>
-        <mc:AlternateContent xmlns:mc="http://schemas.openxmlformats.org/markup-compatibility/2006">
-          <mc:Choice xmlns:a14="http://schemas.microsoft.com/office/drawing/2010/main" Requires="a14">
+        <mc:AlternateContent xmlns:mc="http://schemas.openxmlformats.org/markup-compatibility/2006" xmlns:a14="http://schemas.microsoft.com/office/drawing/2010/main">
+          <mc:Choice Requires="a14">
             <p:sp>
               <p:nvSpPr>
                 <p:cNvPr id="35" name="TextBox 34">
@@ -28800,6 +30129,7 @@
                 </a:bodyPr>
                 <a:lstStyle/>
                 <a:p>
+                  <a:pPr/>
                   <a14:m>
                     <m:oMathPara xmlns:m="http://schemas.openxmlformats.org/officeDocument/2006/math">
                       <m:oMathParaPr>
@@ -28839,7 +30169,7 @@
               </p:txBody>
             </p:sp>
           </mc:Choice>
-          <mc:Fallback>
+          <mc:Fallback xmlns="">
             <p:sp>
               <p:nvSpPr>
                 <p:cNvPr id="35" name="TextBox 34">
@@ -28972,8 +30302,8 @@
           </a:p>
         </p:txBody>
       </p:sp>
-      <mc:AlternateContent xmlns:mc="http://schemas.openxmlformats.org/markup-compatibility/2006">
-        <mc:Choice xmlns:a14="http://schemas.microsoft.com/office/drawing/2010/main" Requires="a14">
+      <mc:AlternateContent xmlns:mc="http://schemas.openxmlformats.org/markup-compatibility/2006" xmlns:a14="http://schemas.microsoft.com/office/drawing/2010/main">
+        <mc:Choice Requires="a14">
           <p:sp>
             <p:nvSpPr>
               <p:cNvPr id="65" name="TextBox 64">
@@ -29002,6 +30332,7 @@
               </a:bodyPr>
               <a:lstStyle/>
               <a:p>
+                <a:pPr/>
                 <a14:m>
                   <m:oMathPara xmlns:m="http://schemas.openxmlformats.org/officeDocument/2006/math">
                     <m:oMathParaPr>
@@ -29034,7 +30365,7 @@
             </p:txBody>
           </p:sp>
         </mc:Choice>
-        <mc:Fallback>
+        <mc:Fallback xmlns="">
           <p:sp>
             <p:nvSpPr>
               <p:cNvPr id="65" name="TextBox 64">
@@ -29079,8 +30410,8 @@
           </p:sp>
         </mc:Fallback>
       </mc:AlternateContent>
-      <mc:AlternateContent xmlns:mc="http://schemas.openxmlformats.org/markup-compatibility/2006">
-        <mc:Choice xmlns:a14="http://schemas.microsoft.com/office/drawing/2010/main" Requires="a14">
+      <mc:AlternateContent xmlns:mc="http://schemas.openxmlformats.org/markup-compatibility/2006" xmlns:a14="http://schemas.microsoft.com/office/drawing/2010/main">
+        <mc:Choice Requires="a14">
           <p:sp>
             <p:nvSpPr>
               <p:cNvPr id="68" name="TextBox 67">
@@ -29186,7 +30517,7 @@
             </p:txBody>
           </p:sp>
         </mc:Choice>
-        <mc:Fallback>
+        <mc:Fallback xmlns="">
           <p:sp>
             <p:nvSpPr>
               <p:cNvPr id="68" name="TextBox 67">
@@ -29785,8 +31116,8 @@
           </a:p>
         </p:txBody>
       </p:sp>
-      <mc:AlternateContent xmlns:mc="http://schemas.openxmlformats.org/markup-compatibility/2006">
-        <mc:Choice xmlns:a14="http://schemas.microsoft.com/office/drawing/2010/main" Requires="a14">
+      <mc:AlternateContent xmlns:mc="http://schemas.openxmlformats.org/markup-compatibility/2006" xmlns:a14="http://schemas.microsoft.com/office/drawing/2010/main">
+        <mc:Choice Requires="a14">
           <p:sp>
             <p:nvSpPr>
               <p:cNvPr id="3" name="Content Placeholder 2">
@@ -30394,7 +31725,7 @@
             </p:txBody>
           </p:sp>
         </mc:Choice>
-        <mc:Fallback>
+        <mc:Fallback xmlns="">
           <p:sp>
             <p:nvSpPr>
               <p:cNvPr id="3" name="Content Placeholder 2">
@@ -31162,8 +32493,8 @@
             </a:fontRef>
           </p:style>
         </p:cxnSp>
-        <mc:AlternateContent xmlns:mc="http://schemas.openxmlformats.org/markup-compatibility/2006">
-          <mc:Choice xmlns:a14="http://schemas.microsoft.com/office/drawing/2010/main" Requires="a14">
+        <mc:AlternateContent xmlns:mc="http://schemas.openxmlformats.org/markup-compatibility/2006" xmlns:a14="http://schemas.microsoft.com/office/drawing/2010/main">
+          <mc:Choice Requires="a14">
             <p:sp>
               <p:nvSpPr>
                 <p:cNvPr id="34" name="TextBox 33">
@@ -31192,6 +32523,7 @@
                 </a:bodyPr>
                 <a:lstStyle/>
                 <a:p>
+                  <a:pPr/>
                   <a14:m>
                     <m:oMathPara xmlns:m="http://schemas.openxmlformats.org/officeDocument/2006/math">
                       <m:oMathParaPr>
@@ -31231,7 +32563,7 @@
               </p:txBody>
             </p:sp>
           </mc:Choice>
-          <mc:Fallback>
+          <mc:Fallback xmlns="">
             <p:sp>
               <p:nvSpPr>
                 <p:cNvPr id="34" name="TextBox 33">
@@ -31276,8 +32608,8 @@
             </p:sp>
           </mc:Fallback>
         </mc:AlternateContent>
-        <mc:AlternateContent xmlns:mc="http://schemas.openxmlformats.org/markup-compatibility/2006">
-          <mc:Choice xmlns:a14="http://schemas.microsoft.com/office/drawing/2010/main" Requires="a14">
+        <mc:AlternateContent xmlns:mc="http://schemas.openxmlformats.org/markup-compatibility/2006" xmlns:a14="http://schemas.microsoft.com/office/drawing/2010/main">
+          <mc:Choice Requires="a14">
             <p:sp>
               <p:nvSpPr>
                 <p:cNvPr id="35" name="TextBox 34">
@@ -31306,6 +32638,7 @@
                 </a:bodyPr>
                 <a:lstStyle/>
                 <a:p>
+                  <a:pPr/>
                   <a14:m>
                     <m:oMathPara xmlns:m="http://schemas.openxmlformats.org/officeDocument/2006/math">
                       <m:oMathParaPr>
@@ -31345,7 +32678,7 @@
               </p:txBody>
             </p:sp>
           </mc:Choice>
-          <mc:Fallback>
+          <mc:Fallback xmlns="">
             <p:sp>
               <p:nvSpPr>
                 <p:cNvPr id="35" name="TextBox 34">
@@ -31530,8 +32863,8 @@
           </a:fontRef>
         </p:style>
       </p:cxnSp>
-      <mc:AlternateContent xmlns:mc="http://schemas.openxmlformats.org/markup-compatibility/2006">
-        <mc:Choice xmlns:a14="http://schemas.microsoft.com/office/drawing/2010/main" Requires="a14">
+      <mc:AlternateContent xmlns:mc="http://schemas.openxmlformats.org/markup-compatibility/2006" xmlns:a14="http://schemas.microsoft.com/office/drawing/2010/main">
+        <mc:Choice Requires="a14">
           <p:sp>
             <p:nvSpPr>
               <p:cNvPr id="69" name="TextBox 68">
@@ -31560,6 +32893,7 @@
               </a:bodyPr>
               <a:lstStyle/>
               <a:p>
+                <a:pPr/>
                 <a14:m>
                   <m:oMathPara xmlns:m="http://schemas.openxmlformats.org/officeDocument/2006/math">
                     <m:oMathParaPr>
@@ -31629,7 +32963,7 @@
             </p:txBody>
           </p:sp>
         </mc:Choice>
-        <mc:Fallback>
+        <mc:Fallback xmlns="">
           <p:sp>
             <p:nvSpPr>
               <p:cNvPr id="69" name="TextBox 68">
@@ -32321,12 +33655,6 @@
 </file>
 
 <file path=customXml/item2.xml><?xml version="1.0" encoding="utf-8"?>
-<p:properties xmlns:p="http://schemas.microsoft.com/office/2006/metadata/properties" xmlns:xsi="http://www.w3.org/2001/XMLSchema-instance" xmlns:pc="http://schemas.microsoft.com/office/infopath/2007/PartnerControls">
-  <documentManagement/>
-</p:properties>
-</file>
-
-<file path=customXml/item3.xml><?xml version="1.0" encoding="utf-8"?>
 <ct:contentTypeSchema xmlns:ct="http://schemas.microsoft.com/office/2006/metadata/contentType" xmlns:ma="http://schemas.microsoft.com/office/2006/metadata/properties/metaAttributes" ct:_="" ma:_="" ma:contentTypeName="Document" ma:contentTypeID="0x010100A06DF21F5BB2734A800ED30F3F452129" ma:contentTypeVersion="12" ma:contentTypeDescription="Create a new document." ma:contentTypeScope="" ma:versionID="544d96a5fbac5de9d5d902b535c73fb2">
   <xsd:schema xmlns:xsd="http://www.w3.org/2001/XMLSchema" xmlns:xs="http://www.w3.org/2001/XMLSchema" xmlns:p="http://schemas.microsoft.com/office/2006/metadata/properties" xmlns:ns3="90d05cb5-950f-4f68-bc2c-e17794455b92" xmlns:ns4="b4eab9fa-dbb0-4082-8491-8bd54207a265" targetNamespace="http://schemas.microsoft.com/office/2006/metadata/properties" ma:root="true" ma:fieldsID="7a710efc71c2169bf9c05e5a40dddf12" ns3:_="" ns4:_="">
     <xsd:import namespace="90d05cb5-950f-4f68-bc2c-e17794455b92"/>
@@ -32543,6 +33871,12 @@
 </ct:contentTypeSchema>
 </file>
 
+<file path=customXml/item3.xml><?xml version="1.0" encoding="utf-8"?>
+<p:properties xmlns:p="http://schemas.microsoft.com/office/2006/metadata/properties" xmlns:xsi="http://www.w3.org/2001/XMLSchema-instance" xmlns:pc="http://schemas.microsoft.com/office/infopath/2007/PartnerControls">
+  <documentManagement/>
+</p:properties>
+</file>
+
 <file path=customXml/itemProps1.xml><?xml version="1.0" encoding="utf-8"?>
 <ds:datastoreItem xmlns:ds="http://schemas.openxmlformats.org/officeDocument/2006/customXml" ds:itemID="{F5CF5F32-56DC-4068-8B04-457CF34A96F3}">
   <ds:schemaRefs>
@@ -32552,23 +33886,6 @@
 </file>
 
 <file path=customXml/itemProps2.xml><?xml version="1.0" encoding="utf-8"?>
-<ds:datastoreItem xmlns:ds="http://schemas.openxmlformats.org/officeDocument/2006/customXml" ds:itemID="{52EB1464-66D1-425A-BBB5-7A9312BBE9C4}">
-  <ds:schemaRefs>
-    <ds:schemaRef ds:uri="http://purl.org/dc/terms/"/>
-    <ds:schemaRef ds:uri="http://schemas.openxmlformats.org/package/2006/metadata/core-properties"/>
-    <ds:schemaRef ds:uri="http://schemas.microsoft.com/office/2006/documentManagement/types"/>
-    <ds:schemaRef ds:uri="90d05cb5-950f-4f68-bc2c-e17794455b92"/>
-    <ds:schemaRef ds:uri="http://purl.org/dc/elements/1.1/"/>
-    <ds:schemaRef ds:uri="http://schemas.microsoft.com/office/2006/metadata/properties"/>
-    <ds:schemaRef ds:uri="http://schemas.microsoft.com/office/infopath/2007/PartnerControls"/>
-    <ds:schemaRef ds:uri="b4eab9fa-dbb0-4082-8491-8bd54207a265"/>
-    <ds:schemaRef ds:uri="http://www.w3.org/XML/1998/namespace"/>
-    <ds:schemaRef ds:uri="http://purl.org/dc/dcmitype/"/>
-  </ds:schemaRefs>
-</ds:datastoreItem>
-</file>
-
-<file path=customXml/itemProps3.xml><?xml version="1.0" encoding="utf-8"?>
 <ds:datastoreItem xmlns:ds="http://schemas.openxmlformats.org/officeDocument/2006/customXml" ds:itemID="{A43B8A4B-79FE-4529-931C-D64224FA70E3}">
   <ds:schemaRefs>
     <ds:schemaRef ds:uri="http://schemas.microsoft.com/office/2006/metadata/contentType"/>
@@ -32585,4 +33902,21 @@
     <ds:schemaRef ds:uri="http://schemas.microsoft.com/internal/obd"/>
   </ds:schemaRefs>
 </ds:datastoreItem>
+</file>
+
+<file path=customXml/itemProps3.xml><?xml version="1.0" encoding="utf-8"?>
+<ds:datastoreItem xmlns:ds="http://schemas.openxmlformats.org/officeDocument/2006/customXml" ds:itemID="{52EB1464-66D1-425A-BBB5-7A9312BBE9C4}">
+  <ds:schemaRefs>
+    <ds:schemaRef ds:uri="http://purl.org/dc/terms/"/>
+    <ds:schemaRef ds:uri="http://schemas.openxmlformats.org/package/2006/metadata/core-properties"/>
+    <ds:schemaRef ds:uri="http://schemas.microsoft.com/office/2006/documentManagement/types"/>
+    <ds:schemaRef ds:uri="90d05cb5-950f-4f68-bc2c-e17794455b92"/>
+    <ds:schemaRef ds:uri="http://purl.org/dc/elements/1.1/"/>
+    <ds:schemaRef ds:uri="http://schemas.microsoft.com/office/2006/metadata/properties"/>
+    <ds:schemaRef ds:uri="http://schemas.microsoft.com/office/infopath/2007/PartnerControls"/>
+    <ds:schemaRef ds:uri="b4eab9fa-dbb0-4082-8491-8bd54207a265"/>
+    <ds:schemaRef ds:uri="http://www.w3.org/XML/1998/namespace"/>
+    <ds:schemaRef ds:uri="http://purl.org/dc/dcmitype/"/>
+  </ds:schemaRefs>
+</ds:datastoreItem>
 </file>
</xml_diff>